<commit_message>
Built site for report: 0.2.0@cbdd7f9
</commit_message>
<xml_diff>
--- a/reference/figures/workflow.pptx
+++ b/reference/figures/workflow.pptx
@@ -6,6 +6,7 @@
   </p:sldMasterIdLst>
   <p:sldIdLst>
     <p:sldId id="256" r:id="rId2"/>
+    <p:sldId id="257" r:id="rId3"/>
   </p:sldIdLst>
   <p:sldSz cx="12192000" cy="6858000"/>
   <p:notesSz cx="6858000" cy="9144000"/>
@@ -104,6 +105,11 @@
       </a:defRPr>
     </a:lvl9pPr>
   </p:defaultTextStyle>
+  <p:extLst>
+    <p:ext uri="{EFAFB233-063F-42B5-8137-9DF3F51BA10A}">
+      <p15:sldGuideLst xmlns:p15="http://schemas.microsoft.com/office/powerpoint/2012/main"/>
+    </p:ext>
+  </p:extLst>
 </p:presentation>
 </file>
 
@@ -256,7 +262,7 @@
           <a:p>
             <a:fld id="{DBBBA43F-26F6-48A1-BB7B-AA1E3BCB6C15}" type="datetimeFigureOut">
               <a:rPr lang="en-GB" smtClean="0"/>
-              <a:t>08/02/2020</a:t>
+              <a:t>28/10/2020</a:t>
             </a:fld>
             <a:endParaRPr lang="en-GB"/>
           </a:p>
@@ -456,7 +462,7 @@
           <a:p>
             <a:fld id="{DBBBA43F-26F6-48A1-BB7B-AA1E3BCB6C15}" type="datetimeFigureOut">
               <a:rPr lang="en-GB" smtClean="0"/>
-              <a:t>08/02/2020</a:t>
+              <a:t>28/10/2020</a:t>
             </a:fld>
             <a:endParaRPr lang="en-GB"/>
           </a:p>
@@ -666,7 +672,7 @@
           <a:p>
             <a:fld id="{DBBBA43F-26F6-48A1-BB7B-AA1E3BCB6C15}" type="datetimeFigureOut">
               <a:rPr lang="en-GB" smtClean="0"/>
-              <a:t>08/02/2020</a:t>
+              <a:t>28/10/2020</a:t>
             </a:fld>
             <a:endParaRPr lang="en-GB"/>
           </a:p>
@@ -866,7 +872,7 @@
           <a:p>
             <a:fld id="{DBBBA43F-26F6-48A1-BB7B-AA1E3BCB6C15}" type="datetimeFigureOut">
               <a:rPr lang="en-GB" smtClean="0"/>
-              <a:t>08/02/2020</a:t>
+              <a:t>28/10/2020</a:t>
             </a:fld>
             <a:endParaRPr lang="en-GB"/>
           </a:p>
@@ -1142,7 +1148,7 @@
           <a:p>
             <a:fld id="{DBBBA43F-26F6-48A1-BB7B-AA1E3BCB6C15}" type="datetimeFigureOut">
               <a:rPr lang="en-GB" smtClean="0"/>
-              <a:t>08/02/2020</a:t>
+              <a:t>28/10/2020</a:t>
             </a:fld>
             <a:endParaRPr lang="en-GB"/>
           </a:p>
@@ -1410,7 +1416,7 @@
           <a:p>
             <a:fld id="{DBBBA43F-26F6-48A1-BB7B-AA1E3BCB6C15}" type="datetimeFigureOut">
               <a:rPr lang="en-GB" smtClean="0"/>
-              <a:t>08/02/2020</a:t>
+              <a:t>28/10/2020</a:t>
             </a:fld>
             <a:endParaRPr lang="en-GB"/>
           </a:p>
@@ -1825,7 +1831,7 @@
           <a:p>
             <a:fld id="{DBBBA43F-26F6-48A1-BB7B-AA1E3BCB6C15}" type="datetimeFigureOut">
               <a:rPr lang="en-GB" smtClean="0"/>
-              <a:t>08/02/2020</a:t>
+              <a:t>28/10/2020</a:t>
             </a:fld>
             <a:endParaRPr lang="en-GB"/>
           </a:p>
@@ -1967,7 +1973,7 @@
           <a:p>
             <a:fld id="{DBBBA43F-26F6-48A1-BB7B-AA1E3BCB6C15}" type="datetimeFigureOut">
               <a:rPr lang="en-GB" smtClean="0"/>
-              <a:t>08/02/2020</a:t>
+              <a:t>28/10/2020</a:t>
             </a:fld>
             <a:endParaRPr lang="en-GB"/>
           </a:p>
@@ -2080,7 +2086,7 @@
           <a:p>
             <a:fld id="{DBBBA43F-26F6-48A1-BB7B-AA1E3BCB6C15}" type="datetimeFigureOut">
               <a:rPr lang="en-GB" smtClean="0"/>
-              <a:t>08/02/2020</a:t>
+              <a:t>28/10/2020</a:t>
             </a:fld>
             <a:endParaRPr lang="en-GB"/>
           </a:p>
@@ -2393,7 +2399,7 @@
           <a:p>
             <a:fld id="{DBBBA43F-26F6-48A1-BB7B-AA1E3BCB6C15}" type="datetimeFigureOut">
               <a:rPr lang="en-GB" smtClean="0"/>
-              <a:t>08/02/2020</a:t>
+              <a:t>28/10/2020</a:t>
             </a:fld>
             <a:endParaRPr lang="en-GB"/>
           </a:p>
@@ -2682,7 +2688,7 @@
           <a:p>
             <a:fld id="{DBBBA43F-26F6-48A1-BB7B-AA1E3BCB6C15}" type="datetimeFigureOut">
               <a:rPr lang="en-GB" smtClean="0"/>
-              <a:t>08/02/2020</a:t>
+              <a:t>28/10/2020</a:t>
             </a:fld>
             <a:endParaRPr lang="en-GB"/>
           </a:p>
@@ -2925,7 +2931,7 @@
           <a:p>
             <a:fld id="{DBBBA43F-26F6-48A1-BB7B-AA1E3BCB6C15}" type="datetimeFigureOut">
               <a:rPr lang="en-GB" smtClean="0"/>
-              <a:t>08/02/2020</a:t>
+              <a:t>28/10/2020</a:t>
             </a:fld>
             <a:endParaRPr lang="en-GB"/>
           </a:p>
@@ -5282,6 +5288,2554 @@
 </p:sld>
 </file>
 
+<file path=ppt/slides/slide2.xml><?xml version="1.0" encoding="utf-8"?>
+<p:sld xmlns:a="http://schemas.openxmlformats.org/drawingml/2006/main" xmlns:r="http://schemas.openxmlformats.org/officeDocument/2006/relationships" xmlns:p="http://schemas.openxmlformats.org/presentationml/2006/main">
+  <p:cSld>
+    <p:spTree>
+      <p:nvGrpSpPr>
+        <p:cNvPr id="1" name=""/>
+        <p:cNvGrpSpPr/>
+        <p:nvPr/>
+      </p:nvGrpSpPr>
+      <p:grpSpPr>
+        <a:xfrm>
+          <a:off x="0" y="0"/>
+          <a:ext cx="0" cy="0"/>
+          <a:chOff x="0" y="0"/>
+          <a:chExt cx="0" cy="0"/>
+        </a:xfrm>
+      </p:grpSpPr>
+      <p:pic>
+        <p:nvPicPr>
+          <p:cNvPr id="2" name="Graphic 1">
+            <a:extLst>
+              <a:ext uri="{FF2B5EF4-FFF2-40B4-BE49-F238E27FC236}">
+                <a16:creationId xmlns:a16="http://schemas.microsoft.com/office/drawing/2014/main" id="{7402A238-C119-4447-88EF-745A416D5028}"/>
+              </a:ext>
+            </a:extLst>
+          </p:cNvPr>
+          <p:cNvPicPr>
+            <a:picLocks noChangeAspect="1"/>
+          </p:cNvPicPr>
+          <p:nvPr/>
+        </p:nvPicPr>
+        <p:blipFill>
+          <a:blip r:embed="rId2">
+            <a:extLst>
+              <a:ext uri="{28A0092B-C50C-407E-A947-70E740481C1C}">
+                <a14:useLocalDpi xmlns:a14="http://schemas.microsoft.com/office/drawing/2010/main" val="0"/>
+              </a:ext>
+              <a:ext uri="{96DAC541-7B7A-43D3-8B79-37D633B846F1}">
+                <asvg:svgBlip xmlns:asvg="http://schemas.microsoft.com/office/drawing/2016/SVG/main" r:embed="rId3"/>
+              </a:ext>
+            </a:extLst>
+          </a:blip>
+          <a:stretch>
+            <a:fillRect/>
+          </a:stretch>
+        </p:blipFill>
+        <p:spPr>
+          <a:xfrm>
+            <a:off x="5474017" y="2807018"/>
+            <a:ext cx="1243965" cy="1243965"/>
+          </a:xfrm>
+          <a:prstGeom prst="rect">
+            <a:avLst/>
+          </a:prstGeom>
+        </p:spPr>
+      </p:pic>
+      <p:sp>
+        <p:nvSpPr>
+          <p:cNvPr id="3" name="Rectangle 2">
+            <a:extLst>
+              <a:ext uri="{FF2B5EF4-FFF2-40B4-BE49-F238E27FC236}">
+                <a16:creationId xmlns:a16="http://schemas.microsoft.com/office/drawing/2014/main" id="{E80DCCC4-9BAF-4A55-9CCC-9BB82C69E800}"/>
+              </a:ext>
+            </a:extLst>
+          </p:cNvPr>
+          <p:cNvSpPr/>
+          <p:nvPr/>
+        </p:nvSpPr>
+        <p:spPr>
+          <a:xfrm>
+            <a:off x="142860" y="2268379"/>
+            <a:ext cx="2315704" cy="2321242"/>
+          </a:xfrm>
+          <a:prstGeom prst="rect">
+            <a:avLst/>
+          </a:prstGeom>
+          <a:noFill/>
+          <a:ln>
+            <a:noFill/>
+          </a:ln>
+        </p:spPr>
+        <p:style>
+          <a:lnRef idx="0">
+            <a:scrgbClr r="0" g="0" b="0"/>
+          </a:lnRef>
+          <a:fillRef idx="0">
+            <a:scrgbClr r="0" g="0" b="0"/>
+          </a:fillRef>
+          <a:effectRef idx="0">
+            <a:scrgbClr r="0" g="0" b="0"/>
+          </a:effectRef>
+          <a:fontRef idx="minor">
+            <a:schemeClr val="dk1"/>
+          </a:fontRef>
+        </p:style>
+        <p:txBody>
+          <a:bodyPr rtlCol="0" anchor="ctr"/>
+          <a:lstStyle/>
+          <a:p>
+            <a:pPr marL="285750" indent="-285750">
+              <a:buFont typeface="Wingdings" panose="05000000000000000000" pitchFamily="2" charset="2"/>
+              <a:buChar char="ü"/>
+            </a:pPr>
+            <a:r>
+              <a:rPr lang="fr-FR" sz="2000" b="1" i="1" dirty="0">
+                <a:solidFill>
+                  <a:srgbClr val="26B999"/>
+                </a:solidFill>
+              </a:rPr>
+              <a:t>t-test</a:t>
+            </a:r>
+          </a:p>
+          <a:p>
+            <a:pPr marL="285750" indent="-285750">
+              <a:buFont typeface="Wingdings" panose="05000000000000000000" pitchFamily="2" charset="2"/>
+              <a:buChar char="ü"/>
+            </a:pPr>
+            <a:r>
+              <a:rPr lang="fr-FR" sz="2000" b="1" i="1" dirty="0" err="1">
+                <a:solidFill>
+                  <a:srgbClr val="26B999"/>
+                </a:solidFill>
+              </a:rPr>
+              <a:t>cor.test</a:t>
+            </a:r>
+            <a:endParaRPr lang="fr-FR" sz="2000" b="1" i="1" dirty="0">
+              <a:solidFill>
+                <a:srgbClr val="26B999"/>
+              </a:solidFill>
+            </a:endParaRPr>
+          </a:p>
+          <a:p>
+            <a:pPr marL="285750" indent="-285750">
+              <a:buFont typeface="Wingdings" panose="05000000000000000000" pitchFamily="2" charset="2"/>
+              <a:buChar char="ü"/>
+            </a:pPr>
+            <a:r>
+              <a:rPr lang="fr-FR" sz="2000" b="1" i="1" dirty="0" err="1">
+                <a:solidFill>
+                  <a:srgbClr val="26B999"/>
+                </a:solidFill>
+              </a:rPr>
+              <a:t>ANOVAs</a:t>
+            </a:r>
+            <a:endParaRPr lang="fr-FR" sz="2000" b="1" i="1" dirty="0">
+              <a:solidFill>
+                <a:srgbClr val="26B999"/>
+              </a:solidFill>
+            </a:endParaRPr>
+          </a:p>
+          <a:p>
+            <a:pPr marL="285750" indent="-285750">
+              <a:buFont typeface="Wingdings" panose="05000000000000000000" pitchFamily="2" charset="2"/>
+              <a:buChar char="ü"/>
+            </a:pPr>
+            <a:r>
+              <a:rPr lang="fr-FR" sz="2000" b="1" i="1" dirty="0" err="1">
+                <a:solidFill>
+                  <a:srgbClr val="26B999"/>
+                </a:solidFill>
+              </a:rPr>
+              <a:t>GLMs</a:t>
+            </a:r>
+            <a:endParaRPr lang="fr-FR" sz="2000" b="1" i="1" dirty="0">
+              <a:solidFill>
+                <a:srgbClr val="26B999"/>
+              </a:solidFill>
+            </a:endParaRPr>
+          </a:p>
+          <a:p>
+            <a:pPr marL="285750" indent="-285750">
+              <a:buFont typeface="Wingdings" panose="05000000000000000000" pitchFamily="2" charset="2"/>
+              <a:buChar char="ü"/>
+            </a:pPr>
+            <a:r>
+              <a:rPr lang="fr-FR" sz="2000" b="1" i="1" dirty="0">
+                <a:solidFill>
+                  <a:srgbClr val="26B999"/>
+                </a:solidFill>
+              </a:rPr>
+              <a:t>Mixed </a:t>
+            </a:r>
+            <a:r>
+              <a:rPr lang="fr-FR" sz="2000" b="1" i="1" dirty="0" err="1">
+                <a:solidFill>
+                  <a:srgbClr val="26B999"/>
+                </a:solidFill>
+              </a:rPr>
+              <a:t>models</a:t>
+            </a:r>
+            <a:endParaRPr lang="fr-FR" sz="2000" b="1" i="1" dirty="0">
+              <a:solidFill>
+                <a:srgbClr val="26B999"/>
+              </a:solidFill>
+            </a:endParaRPr>
+          </a:p>
+          <a:p>
+            <a:pPr marL="285750" indent="-285750">
+              <a:buFont typeface="Wingdings" panose="05000000000000000000" pitchFamily="2" charset="2"/>
+              <a:buChar char="ü"/>
+            </a:pPr>
+            <a:r>
+              <a:rPr lang="fr-FR" sz="2000" b="1" i="1" dirty="0" err="1">
+                <a:solidFill>
+                  <a:srgbClr val="26B999"/>
+                </a:solidFill>
+              </a:rPr>
+              <a:t>Bayesian</a:t>
+            </a:r>
+            <a:r>
+              <a:rPr lang="fr-FR" sz="2000" b="1" i="1" dirty="0">
+                <a:solidFill>
+                  <a:srgbClr val="26B999"/>
+                </a:solidFill>
+              </a:rPr>
+              <a:t> </a:t>
+            </a:r>
+            <a:r>
+              <a:rPr lang="fr-FR" sz="2000" b="1" i="1" dirty="0" err="1">
+                <a:solidFill>
+                  <a:srgbClr val="26B999"/>
+                </a:solidFill>
+              </a:rPr>
+              <a:t>models</a:t>
+            </a:r>
+            <a:endParaRPr lang="fr-FR" sz="2000" b="1" i="1" dirty="0">
+              <a:solidFill>
+                <a:srgbClr val="26B999"/>
+              </a:solidFill>
+            </a:endParaRPr>
+          </a:p>
+          <a:p>
+            <a:pPr marL="285750" indent="-285750">
+              <a:buFont typeface="Wingdings" panose="05000000000000000000" pitchFamily="2" charset="2"/>
+              <a:buChar char="ü"/>
+            </a:pPr>
+            <a:r>
+              <a:rPr lang="fr-FR" sz="2000" b="1" i="1" dirty="0" err="1">
+                <a:solidFill>
+                  <a:srgbClr val="26B999"/>
+                </a:solidFill>
+              </a:rPr>
+              <a:t>data.frame</a:t>
+            </a:r>
+            <a:endParaRPr lang="fr-FR" sz="2000" b="1" i="1" dirty="0">
+              <a:solidFill>
+                <a:srgbClr val="26B999"/>
+              </a:solidFill>
+            </a:endParaRPr>
+          </a:p>
+          <a:p>
+            <a:pPr marL="285750" indent="-285750">
+              <a:buFont typeface="Wingdings" panose="05000000000000000000" pitchFamily="2" charset="2"/>
+              <a:buChar char="ü"/>
+            </a:pPr>
+            <a:r>
+              <a:rPr lang="fr-FR" sz="2000" b="1" i="1" dirty="0">
+                <a:solidFill>
+                  <a:srgbClr val="26B999"/>
+                </a:solidFill>
+              </a:rPr>
+              <a:t>…</a:t>
+            </a:r>
+            <a:endParaRPr lang="en-GB" sz="2000" b="1" i="1" dirty="0">
+              <a:solidFill>
+                <a:srgbClr val="26B999"/>
+              </a:solidFill>
+            </a:endParaRPr>
+          </a:p>
+        </p:txBody>
+      </p:sp>
+      <p:sp>
+        <p:nvSpPr>
+          <p:cNvPr id="4" name="Rectangle 3">
+            <a:extLst>
+              <a:ext uri="{FF2B5EF4-FFF2-40B4-BE49-F238E27FC236}">
+                <a16:creationId xmlns:a16="http://schemas.microsoft.com/office/drawing/2014/main" id="{AC78F145-224D-4F3D-9FB9-91F0BBFA9F66}"/>
+              </a:ext>
+            </a:extLst>
+          </p:cNvPr>
+          <p:cNvSpPr/>
+          <p:nvPr/>
+        </p:nvSpPr>
+        <p:spPr>
+          <a:xfrm>
+            <a:off x="2915455" y="2768817"/>
+            <a:ext cx="2101670" cy="693420"/>
+          </a:xfrm>
+          <a:prstGeom prst="rect">
+            <a:avLst/>
+          </a:prstGeom>
+          <a:noFill/>
+          <a:ln>
+            <a:noFill/>
+          </a:ln>
+        </p:spPr>
+        <p:style>
+          <a:lnRef idx="0">
+            <a:scrgbClr r="0" g="0" b="0"/>
+          </a:lnRef>
+          <a:fillRef idx="0">
+            <a:scrgbClr r="0" g="0" b="0"/>
+          </a:fillRef>
+          <a:effectRef idx="0">
+            <a:scrgbClr r="0" g="0" b="0"/>
+          </a:effectRef>
+          <a:fontRef idx="minor">
+            <a:schemeClr val="dk1"/>
+          </a:fontRef>
+        </p:style>
+        <p:txBody>
+          <a:bodyPr rtlCol="0" anchor="ctr"/>
+          <a:lstStyle/>
+          <a:p>
+            <a:pPr algn="ctr"/>
+            <a:r>
+              <a:rPr lang="fr-FR" sz="3200" b="1" dirty="0">
+                <a:solidFill>
+                  <a:srgbClr val="F6591A"/>
+                </a:solidFill>
+                <a:latin typeface="Consolas" panose="020B0609020204030204" pitchFamily="49" charset="0"/>
+              </a:rPr>
+              <a:t>report()</a:t>
+            </a:r>
+            <a:endParaRPr lang="en-GB" sz="3200" b="1" dirty="0">
+              <a:solidFill>
+                <a:srgbClr val="F6591A"/>
+              </a:solidFill>
+              <a:latin typeface="Consolas" panose="020B0609020204030204" pitchFamily="49" charset="0"/>
+            </a:endParaRPr>
+          </a:p>
+        </p:txBody>
+      </p:sp>
+      <p:cxnSp>
+        <p:nvCxnSpPr>
+          <p:cNvPr id="5" name="Straight Arrow Connector 4">
+            <a:extLst>
+              <a:ext uri="{FF2B5EF4-FFF2-40B4-BE49-F238E27FC236}">
+                <a16:creationId xmlns:a16="http://schemas.microsoft.com/office/drawing/2014/main" id="{7C51E6C0-6C5E-4E2E-B6A0-C849BF3B166E}"/>
+              </a:ext>
+            </a:extLst>
+          </p:cNvPr>
+          <p:cNvCxnSpPr>
+            <a:cxnSpLocks/>
+            <a:stCxn id="3" idx="3"/>
+            <a:endCxn id="2" idx="1"/>
+          </p:cNvCxnSpPr>
+          <p:nvPr/>
+        </p:nvCxnSpPr>
+        <p:spPr>
+          <a:xfrm>
+            <a:off x="2458564" y="3429000"/>
+            <a:ext cx="3015453" cy="1"/>
+          </a:xfrm>
+          <a:prstGeom prst="straightConnector1">
+            <a:avLst/>
+          </a:prstGeom>
+          <a:ln w="57150">
+            <a:tailEnd type="triangle"/>
+          </a:ln>
+        </p:spPr>
+        <p:style>
+          <a:lnRef idx="1">
+            <a:schemeClr val="dk1"/>
+          </a:lnRef>
+          <a:fillRef idx="0">
+            <a:schemeClr val="dk1"/>
+          </a:fillRef>
+          <a:effectRef idx="0">
+            <a:schemeClr val="dk1"/>
+          </a:effectRef>
+          <a:fontRef idx="minor">
+            <a:schemeClr val="tx1"/>
+          </a:fontRef>
+        </p:style>
+      </p:cxnSp>
+      <p:sp>
+        <p:nvSpPr>
+          <p:cNvPr id="7" name="Rectangle 6">
+            <a:extLst>
+              <a:ext uri="{FF2B5EF4-FFF2-40B4-BE49-F238E27FC236}">
+                <a16:creationId xmlns:a16="http://schemas.microsoft.com/office/drawing/2014/main" id="{C379034D-D959-4221-8924-184518B2037E}"/>
+              </a:ext>
+            </a:extLst>
+          </p:cNvPr>
+          <p:cNvSpPr/>
+          <p:nvPr/>
+        </p:nvSpPr>
+        <p:spPr>
+          <a:xfrm>
+            <a:off x="2262118" y="4521928"/>
+            <a:ext cx="3015454" cy="2321242"/>
+          </a:xfrm>
+          <a:prstGeom prst="rect">
+            <a:avLst/>
+          </a:prstGeom>
+          <a:noFill/>
+          <a:ln>
+            <a:noFill/>
+          </a:ln>
+        </p:spPr>
+        <p:style>
+          <a:lnRef idx="0">
+            <a:scrgbClr r="0" g="0" b="0"/>
+          </a:lnRef>
+          <a:fillRef idx="0">
+            <a:scrgbClr r="0" g="0" b="0"/>
+          </a:fillRef>
+          <a:effectRef idx="0">
+            <a:scrgbClr r="0" g="0" b="0"/>
+          </a:effectRef>
+          <a:fontRef idx="minor">
+            <a:schemeClr val="dk1"/>
+          </a:fontRef>
+        </p:style>
+        <p:txBody>
+          <a:bodyPr rtlCol="0" anchor="ctr"/>
+          <a:lstStyle/>
+          <a:p>
+            <a:r>
+              <a:rPr lang="fr-FR" sz="2000" b="1" i="1" dirty="0">
+                <a:solidFill>
+                  <a:schemeClr val="bg1">
+                    <a:lumMod val="50000"/>
+                  </a:schemeClr>
+                </a:solidFill>
+              </a:rPr>
+              <a:t>Direct </a:t>
+            </a:r>
+            <a:r>
+              <a:rPr lang="fr-FR" sz="2000" b="1" i="1" dirty="0" err="1">
+                <a:solidFill>
+                  <a:schemeClr val="bg1">
+                    <a:lumMod val="50000"/>
+                  </a:schemeClr>
+                </a:solidFill>
+              </a:rPr>
+              <a:t>access</a:t>
+            </a:r>
+            <a:r>
+              <a:rPr lang="fr-FR" sz="2000" b="1" i="1" dirty="0">
+                <a:solidFill>
+                  <a:schemeClr val="bg1">
+                    <a:lumMod val="50000"/>
+                  </a:schemeClr>
+                </a:solidFill>
+              </a:rPr>
+              <a:t> to </a:t>
+            </a:r>
+            <a:r>
+              <a:rPr lang="fr-FR" sz="2000" b="1" i="1" dirty="0" err="1">
+                <a:solidFill>
+                  <a:schemeClr val="bg1">
+                    <a:lumMod val="50000"/>
+                  </a:schemeClr>
+                </a:solidFill>
+              </a:rPr>
+              <a:t>subparts</a:t>
+            </a:r>
+            <a:r>
+              <a:rPr lang="fr-FR" sz="2000" b="1" i="1" dirty="0">
+                <a:solidFill>
+                  <a:schemeClr val="bg1">
+                    <a:lumMod val="50000"/>
+                  </a:schemeClr>
+                </a:solidFill>
+              </a:rPr>
+              <a:t>:</a:t>
+            </a:r>
+          </a:p>
+          <a:p>
+            <a:pPr marL="342900" indent="-342900">
+              <a:buFont typeface="Calibri" panose="020F0502020204030204" pitchFamily="34" charset="0"/>
+              <a:buChar char="‒"/>
+            </a:pPr>
+            <a:r>
+              <a:rPr lang="fr-FR" b="1" i="1" dirty="0" err="1">
+                <a:solidFill>
+                  <a:srgbClr val="F6591A"/>
+                </a:solidFill>
+                <a:latin typeface="Consolas" panose="020B0609020204030204" pitchFamily="49" charset="0"/>
+              </a:rPr>
+              <a:t>report_text</a:t>
+            </a:r>
+            <a:r>
+              <a:rPr lang="fr-FR" b="1" i="1" dirty="0">
+                <a:solidFill>
+                  <a:srgbClr val="F6591A"/>
+                </a:solidFill>
+                <a:latin typeface="Consolas" panose="020B0609020204030204" pitchFamily="49" charset="0"/>
+              </a:rPr>
+              <a:t>()</a:t>
+            </a:r>
+          </a:p>
+          <a:p>
+            <a:pPr marL="342900" indent="-342900">
+              <a:buFont typeface="Calibri" panose="020F0502020204030204" pitchFamily="34" charset="0"/>
+              <a:buChar char="‒"/>
+            </a:pPr>
+            <a:r>
+              <a:rPr lang="fr-FR" b="1" i="1" dirty="0" err="1">
+                <a:solidFill>
+                  <a:srgbClr val="F6591A"/>
+                </a:solidFill>
+                <a:latin typeface="Consolas" panose="020B0609020204030204" pitchFamily="49" charset="0"/>
+              </a:rPr>
+              <a:t>report_table</a:t>
+            </a:r>
+            <a:r>
+              <a:rPr lang="fr-FR" b="1" i="1" dirty="0">
+                <a:solidFill>
+                  <a:srgbClr val="F6591A"/>
+                </a:solidFill>
+                <a:latin typeface="Consolas" panose="020B0609020204030204" pitchFamily="49" charset="0"/>
+              </a:rPr>
+              <a:t>()</a:t>
+            </a:r>
+          </a:p>
+          <a:p>
+            <a:pPr marL="342900" indent="-342900">
+              <a:buFont typeface="Calibri" panose="020F0502020204030204" pitchFamily="34" charset="0"/>
+              <a:buChar char="‒"/>
+            </a:pPr>
+            <a:r>
+              <a:rPr lang="en-GB" b="1" i="1" dirty="0" err="1">
+                <a:solidFill>
+                  <a:srgbClr val="F6591A"/>
+                </a:solidFill>
+                <a:latin typeface="Consolas" panose="020B0609020204030204" pitchFamily="49" charset="0"/>
+              </a:rPr>
+              <a:t>report_model</a:t>
+            </a:r>
+            <a:r>
+              <a:rPr lang="en-GB" b="1" i="1" dirty="0">
+                <a:solidFill>
+                  <a:srgbClr val="F6591A"/>
+                </a:solidFill>
+                <a:latin typeface="Consolas" panose="020B0609020204030204" pitchFamily="49" charset="0"/>
+              </a:rPr>
+              <a:t>()</a:t>
+            </a:r>
+            <a:endParaRPr lang="fr-FR" b="1" i="1" dirty="0">
+              <a:solidFill>
+                <a:srgbClr val="F6591A"/>
+              </a:solidFill>
+              <a:latin typeface="Consolas" panose="020B0609020204030204" pitchFamily="49" charset="0"/>
+            </a:endParaRPr>
+          </a:p>
+          <a:p>
+            <a:pPr marL="342900" indent="-342900">
+              <a:buFont typeface="Calibri" panose="020F0502020204030204" pitchFamily="34" charset="0"/>
+              <a:buChar char="‒"/>
+            </a:pPr>
+            <a:r>
+              <a:rPr lang="fr-FR" b="1" i="1" dirty="0" err="1">
+                <a:solidFill>
+                  <a:srgbClr val="F6591A"/>
+                </a:solidFill>
+                <a:latin typeface="Consolas" panose="020B0609020204030204" pitchFamily="49" charset="0"/>
+              </a:rPr>
+              <a:t>report_statistics</a:t>
+            </a:r>
+            <a:r>
+              <a:rPr lang="fr-FR" b="1" i="1" dirty="0">
+                <a:solidFill>
+                  <a:srgbClr val="F6591A"/>
+                </a:solidFill>
+                <a:latin typeface="Consolas" panose="020B0609020204030204" pitchFamily="49" charset="0"/>
+              </a:rPr>
+              <a:t>()</a:t>
+            </a:r>
+          </a:p>
+          <a:p>
+            <a:pPr marL="342900" indent="-342900">
+              <a:buFont typeface="Calibri" panose="020F0502020204030204" pitchFamily="34" charset="0"/>
+              <a:buChar char="‒"/>
+            </a:pPr>
+            <a:r>
+              <a:rPr lang="en-GB" b="1" i="1" dirty="0" err="1">
+                <a:solidFill>
+                  <a:srgbClr val="F6591A"/>
+                </a:solidFill>
+                <a:latin typeface="Consolas" panose="020B0609020204030204" pitchFamily="49" charset="0"/>
+              </a:rPr>
+              <a:t>report_parameters</a:t>
+            </a:r>
+            <a:r>
+              <a:rPr lang="en-GB" b="1" i="1" dirty="0">
+                <a:solidFill>
+                  <a:srgbClr val="F6591A"/>
+                </a:solidFill>
+                <a:latin typeface="Consolas" panose="020B0609020204030204" pitchFamily="49" charset="0"/>
+              </a:rPr>
+              <a:t>()</a:t>
+            </a:r>
+          </a:p>
+          <a:p>
+            <a:pPr marL="342900" indent="-342900">
+              <a:buFont typeface="Calibri" panose="020F0502020204030204" pitchFamily="34" charset="0"/>
+              <a:buChar char="‒"/>
+            </a:pPr>
+            <a:r>
+              <a:rPr lang="en-GB" b="1" i="1" dirty="0">
+                <a:solidFill>
+                  <a:srgbClr val="F6591A"/>
+                </a:solidFill>
+                <a:latin typeface="Consolas" panose="020B0609020204030204" pitchFamily="49" charset="0"/>
+              </a:rPr>
+              <a:t>…</a:t>
+            </a:r>
+          </a:p>
+        </p:txBody>
+      </p:sp>
+      <p:cxnSp>
+        <p:nvCxnSpPr>
+          <p:cNvPr id="8" name="Straight Arrow Connector 7">
+            <a:extLst>
+              <a:ext uri="{FF2B5EF4-FFF2-40B4-BE49-F238E27FC236}">
+                <a16:creationId xmlns:a16="http://schemas.microsoft.com/office/drawing/2014/main" id="{2BFF0453-7CFD-4144-9B94-398E0F755758}"/>
+              </a:ext>
+            </a:extLst>
+          </p:cNvPr>
+          <p:cNvCxnSpPr>
+            <a:cxnSpLocks/>
+          </p:cNvCxnSpPr>
+          <p:nvPr/>
+        </p:nvCxnSpPr>
+        <p:spPr>
+          <a:xfrm flipH="1" flipV="1">
+            <a:off x="7084780" y="1363221"/>
+            <a:ext cx="541020" cy="598929"/>
+          </a:xfrm>
+          <a:prstGeom prst="straightConnector1">
+            <a:avLst/>
+          </a:prstGeom>
+          <a:ln w="19050">
+            <a:solidFill>
+              <a:schemeClr val="bg2">
+                <a:lumMod val="75000"/>
+              </a:schemeClr>
+            </a:solidFill>
+            <a:prstDash val="sysDash"/>
+            <a:tailEnd type="triangle"/>
+          </a:ln>
+        </p:spPr>
+        <p:style>
+          <a:lnRef idx="1">
+            <a:schemeClr val="dk1"/>
+          </a:lnRef>
+          <a:fillRef idx="0">
+            <a:schemeClr val="dk1"/>
+          </a:fillRef>
+          <a:effectRef idx="0">
+            <a:schemeClr val="dk1"/>
+          </a:effectRef>
+          <a:fontRef idx="minor">
+            <a:schemeClr val="tx1"/>
+          </a:fontRef>
+        </p:style>
+      </p:cxnSp>
+      <p:sp>
+        <p:nvSpPr>
+          <p:cNvPr id="9" name="Rectangle 8">
+            <a:extLst>
+              <a:ext uri="{FF2B5EF4-FFF2-40B4-BE49-F238E27FC236}">
+                <a16:creationId xmlns:a16="http://schemas.microsoft.com/office/drawing/2014/main" id="{3B73827D-E365-421B-9526-4512D396A27E}"/>
+              </a:ext>
+            </a:extLst>
+          </p:cNvPr>
+          <p:cNvSpPr/>
+          <p:nvPr/>
+        </p:nvSpPr>
+        <p:spPr>
+          <a:xfrm>
+            <a:off x="9298305" y="117408"/>
+            <a:ext cx="2468880" cy="2164257"/>
+          </a:xfrm>
+          <a:prstGeom prst="rect">
+            <a:avLst/>
+          </a:prstGeom>
+          <a:noFill/>
+          <a:ln>
+            <a:noFill/>
+          </a:ln>
+        </p:spPr>
+        <p:style>
+          <a:lnRef idx="0">
+            <a:scrgbClr r="0" g="0" b="0"/>
+          </a:lnRef>
+          <a:fillRef idx="0">
+            <a:scrgbClr r="0" g="0" b="0"/>
+          </a:fillRef>
+          <a:effectRef idx="0">
+            <a:scrgbClr r="0" g="0" b="0"/>
+          </a:effectRef>
+          <a:fontRef idx="minor">
+            <a:schemeClr val="dk1"/>
+          </a:fontRef>
+        </p:style>
+        <p:txBody>
+          <a:bodyPr rtlCol="0" anchor="ctr"/>
+          <a:lstStyle/>
+          <a:p>
+            <a:pPr algn="just"/>
+            <a:r>
+              <a:rPr lang="en-GB" sz="1200" b="1" dirty="0">
+                <a:solidFill>
+                  <a:schemeClr val="tx1"/>
+                </a:solidFill>
+                <a:latin typeface="Brush Script MT" panose="03060802040406070304" pitchFamily="66" charset="0"/>
+              </a:rPr>
+              <a:t>Did you ever hear the Tragedy of Darth </a:t>
+            </a:r>
+            <a:r>
+              <a:rPr lang="en-GB" sz="1200" b="1" dirty="0" err="1">
+                <a:solidFill>
+                  <a:schemeClr val="tx1"/>
+                </a:solidFill>
+                <a:latin typeface="Brush Script MT" panose="03060802040406070304" pitchFamily="66" charset="0"/>
+              </a:rPr>
+              <a:t>Plagueis</a:t>
+            </a:r>
+            <a:r>
+              <a:rPr lang="en-GB" sz="1200" b="1" dirty="0">
+                <a:solidFill>
+                  <a:schemeClr val="tx1"/>
+                </a:solidFill>
+                <a:latin typeface="Brush Script MT" panose="03060802040406070304" pitchFamily="66" charset="0"/>
+              </a:rPr>
+              <a:t> the wise? I thought not. It's not a story the Jedi would tell you. It's a Sith legend. Darth </a:t>
+            </a:r>
+            <a:r>
+              <a:rPr lang="en-GB" sz="1200" b="1" dirty="0" err="1">
+                <a:solidFill>
+                  <a:schemeClr val="tx1"/>
+                </a:solidFill>
+                <a:latin typeface="Brush Script MT" panose="03060802040406070304" pitchFamily="66" charset="0"/>
+              </a:rPr>
+              <a:t>Plagueis</a:t>
+            </a:r>
+            <a:r>
+              <a:rPr lang="en-GB" sz="1200" b="1" dirty="0">
+                <a:solidFill>
+                  <a:schemeClr val="tx1"/>
+                </a:solidFill>
+                <a:latin typeface="Brush Script MT" panose="03060802040406070304" pitchFamily="66" charset="0"/>
+              </a:rPr>
+              <a:t> was a Dark Lord of the Sith, so powerful and so wise he could use the power of </a:t>
+            </a:r>
+            <a:r>
+              <a:rPr lang="en-GB" sz="1200" b="1" dirty="0" err="1">
+                <a:solidFill>
+                  <a:schemeClr val="tx1"/>
+                </a:solidFill>
+                <a:latin typeface="Brush Script MT" panose="03060802040406070304" pitchFamily="66" charset="0"/>
+              </a:rPr>
+              <a:t>easystats</a:t>
+            </a:r>
+            <a:r>
+              <a:rPr lang="en-GB" sz="1200" b="1" dirty="0">
+                <a:solidFill>
+                  <a:schemeClr val="tx1"/>
+                </a:solidFill>
+                <a:latin typeface="Brush Script MT" panose="03060802040406070304" pitchFamily="66" charset="0"/>
+              </a:rPr>
+              <a:t> to influence the </a:t>
+            </a:r>
+            <a:r>
+              <a:rPr lang="en-GB" sz="1200" b="1" dirty="0" err="1">
+                <a:solidFill>
+                  <a:schemeClr val="tx1"/>
+                </a:solidFill>
+                <a:latin typeface="Brush Script MT" panose="03060802040406070304" pitchFamily="66" charset="0"/>
+              </a:rPr>
+              <a:t>midichlorians</a:t>
+            </a:r>
+            <a:r>
+              <a:rPr lang="en-GB" sz="1200" b="1" dirty="0">
+                <a:solidFill>
+                  <a:schemeClr val="tx1"/>
+                </a:solidFill>
+                <a:latin typeface="Brush Script MT" panose="03060802040406070304" pitchFamily="66" charset="0"/>
+              </a:rPr>
+              <a:t> to create life... He had such a knowledge of the report package that he could even keep the ones he cared about from dying. The dark side of </a:t>
+            </a:r>
+            <a:r>
+              <a:rPr lang="en-GB" sz="1200" b="1" dirty="0" err="1">
+                <a:solidFill>
+                  <a:schemeClr val="tx1"/>
+                </a:solidFill>
+                <a:latin typeface="Brush Script MT" panose="03060802040406070304" pitchFamily="66" charset="0"/>
+              </a:rPr>
+              <a:t>easystats</a:t>
+            </a:r>
+            <a:r>
+              <a:rPr lang="en-GB" sz="1200" b="1" dirty="0">
+                <a:solidFill>
+                  <a:schemeClr val="tx1"/>
+                </a:solidFill>
+                <a:latin typeface="Brush Script MT" panose="03060802040406070304" pitchFamily="66" charset="0"/>
+              </a:rPr>
+              <a:t> is a pathway to many abilities some consider to be… unnatural.</a:t>
+            </a:r>
+            <a:r>
+              <a:rPr lang="fr-FR" sz="1200" b="1" dirty="0">
+                <a:solidFill>
+                  <a:schemeClr val="tx1"/>
+                </a:solidFill>
+                <a:latin typeface="Brush Script MT" panose="03060802040406070304" pitchFamily="66" charset="0"/>
+              </a:rPr>
+              <a:t> </a:t>
+            </a:r>
+            <a:endParaRPr lang="en-GB" sz="1200" b="1" dirty="0">
+              <a:solidFill>
+                <a:schemeClr val="tx1"/>
+              </a:solidFill>
+              <a:latin typeface="Brush Script MT" panose="03060802040406070304" pitchFamily="66" charset="0"/>
+            </a:endParaRPr>
+          </a:p>
+        </p:txBody>
+      </p:sp>
+      <p:sp>
+        <p:nvSpPr>
+          <p:cNvPr id="10" name="Rectangle 9">
+            <a:extLst>
+              <a:ext uri="{FF2B5EF4-FFF2-40B4-BE49-F238E27FC236}">
+                <a16:creationId xmlns:a16="http://schemas.microsoft.com/office/drawing/2014/main" id="{12948FBA-39CA-4F75-88A4-26BCA85403D0}"/>
+              </a:ext>
+            </a:extLst>
+          </p:cNvPr>
+          <p:cNvSpPr/>
+          <p:nvPr/>
+        </p:nvSpPr>
+        <p:spPr>
+          <a:xfrm>
+            <a:off x="9281671" y="2422107"/>
+            <a:ext cx="2468880" cy="693420"/>
+          </a:xfrm>
+          <a:prstGeom prst="rect">
+            <a:avLst/>
+          </a:prstGeom>
+          <a:noFill/>
+          <a:ln>
+            <a:noFill/>
+          </a:ln>
+        </p:spPr>
+        <p:style>
+          <a:lnRef idx="0">
+            <a:scrgbClr r="0" g="0" b="0"/>
+          </a:lnRef>
+          <a:fillRef idx="0">
+            <a:scrgbClr r="0" g="0" b="0"/>
+          </a:fillRef>
+          <a:effectRef idx="0">
+            <a:scrgbClr r="0" g="0" b="0"/>
+          </a:effectRef>
+          <a:fontRef idx="minor">
+            <a:schemeClr val="dk1"/>
+          </a:fontRef>
+        </p:style>
+        <p:txBody>
+          <a:bodyPr rtlCol="0" anchor="ctr"/>
+          <a:lstStyle/>
+          <a:p>
+            <a:r>
+              <a:rPr lang="fr-FR" sz="2400" b="1" dirty="0">
+                <a:solidFill>
+                  <a:schemeClr val="tx1"/>
+                </a:solidFill>
+                <a:latin typeface="Brush Script MT" panose="03060802040406070304" pitchFamily="66" charset="0"/>
+              </a:rPr>
+              <a:t>Short </a:t>
+            </a:r>
+            <a:r>
+              <a:rPr lang="fr-FR" sz="2400" b="1" dirty="0" err="1">
+                <a:solidFill>
+                  <a:schemeClr val="tx1"/>
+                </a:solidFill>
+                <a:latin typeface="Brush Script MT" panose="03060802040406070304" pitchFamily="66" charset="0"/>
+              </a:rPr>
+              <a:t>textual</a:t>
+            </a:r>
+            <a:r>
+              <a:rPr lang="fr-FR" sz="2400" b="1" dirty="0">
+                <a:solidFill>
+                  <a:schemeClr val="tx1"/>
+                </a:solidFill>
+                <a:latin typeface="Brush Script MT" panose="03060802040406070304" pitchFamily="66" charset="0"/>
+              </a:rPr>
+              <a:t> </a:t>
+            </a:r>
+            <a:r>
+              <a:rPr lang="fr-FR" sz="2400" b="1" dirty="0" err="1">
+                <a:solidFill>
+                  <a:schemeClr val="tx1"/>
+                </a:solidFill>
+                <a:latin typeface="Brush Script MT" panose="03060802040406070304" pitchFamily="66" charset="0"/>
+              </a:rPr>
+              <a:t>summary</a:t>
+            </a:r>
+            <a:endParaRPr lang="en-GB" sz="2400" b="1" dirty="0">
+              <a:solidFill>
+                <a:schemeClr val="tx1"/>
+              </a:solidFill>
+              <a:latin typeface="Brush Script MT" panose="03060802040406070304" pitchFamily="66" charset="0"/>
+            </a:endParaRPr>
+          </a:p>
+        </p:txBody>
+      </p:sp>
+      <p:graphicFrame>
+        <p:nvGraphicFramePr>
+          <p:cNvPr id="11" name="Table 23">
+            <a:extLst>
+              <a:ext uri="{FF2B5EF4-FFF2-40B4-BE49-F238E27FC236}">
+                <a16:creationId xmlns:a16="http://schemas.microsoft.com/office/drawing/2014/main" id="{E8DEDB6C-99C0-4DC7-AEF3-53A4711F3442}"/>
+              </a:ext>
+            </a:extLst>
+          </p:cNvPr>
+          <p:cNvGraphicFramePr>
+            <a:graphicFrameLocks noGrp="1"/>
+          </p:cNvGraphicFramePr>
+          <p:nvPr>
+            <p:extLst>
+              <p:ext uri="{D42A27DB-BD31-4B8C-83A1-F6EECF244321}">
+                <p14:modId xmlns:p14="http://schemas.microsoft.com/office/powerpoint/2010/main" val="794294271"/>
+              </p:ext>
+            </p:extLst>
+          </p:nvPr>
+        </p:nvGraphicFramePr>
+        <p:xfrm>
+          <a:off x="9298305" y="3571557"/>
+          <a:ext cx="2468880" cy="1097280"/>
+        </p:xfrm>
+        <a:graphic>
+          <a:graphicData uri="http://schemas.openxmlformats.org/drawingml/2006/table">
+            <a:tbl>
+              <a:tblPr firstRow="1">
+                <a:tableStyleId>{9D7B26C5-4107-4FEC-AEDC-1716B250A1EF}</a:tableStyleId>
+              </a:tblPr>
+              <a:tblGrid>
+                <a:gridCol w="822960">
+                  <a:extLst>
+                    <a:ext uri="{9D8B030D-6E8A-4147-A177-3AD203B41FA5}">
+                      <a16:colId xmlns:a16="http://schemas.microsoft.com/office/drawing/2014/main" val="568821903"/>
+                    </a:ext>
+                  </a:extLst>
+                </a:gridCol>
+                <a:gridCol w="822960">
+                  <a:extLst>
+                    <a:ext uri="{9D8B030D-6E8A-4147-A177-3AD203B41FA5}">
+                      <a16:colId xmlns:a16="http://schemas.microsoft.com/office/drawing/2014/main" val="2344657756"/>
+                    </a:ext>
+                  </a:extLst>
+                </a:gridCol>
+                <a:gridCol w="822960">
+                  <a:extLst>
+                    <a:ext uri="{9D8B030D-6E8A-4147-A177-3AD203B41FA5}">
+                      <a16:colId xmlns:a16="http://schemas.microsoft.com/office/drawing/2014/main" val="2698870531"/>
+                    </a:ext>
+                  </a:extLst>
+                </a:gridCol>
+              </a:tblGrid>
+              <a:tr h="243126">
+                <a:tc>
+                  <a:txBody>
+                    <a:bodyPr/>
+                    <a:lstStyle/>
+                    <a:p>
+                      <a:pPr algn="ctr"/>
+                      <a:r>
+                        <a:rPr lang="fr-FR" sz="1200" dirty="0"/>
+                        <a:t>X</a:t>
+                      </a:r>
+                      <a:endParaRPr lang="en-GB" sz="1200" dirty="0"/>
+                    </a:p>
+                  </a:txBody>
+                  <a:tcPr anchor="ctr"/>
+                </a:tc>
+                <a:tc>
+                  <a:txBody>
+                    <a:bodyPr/>
+                    <a:lstStyle/>
+                    <a:p>
+                      <a:pPr algn="ctr"/>
+                      <a:r>
+                        <a:rPr lang="fr-FR" sz="1200" dirty="0"/>
+                        <a:t>Y</a:t>
+                      </a:r>
+                      <a:endParaRPr lang="en-GB" sz="1200" dirty="0"/>
+                    </a:p>
+                  </a:txBody>
+                  <a:tcPr anchor="ctr"/>
+                </a:tc>
+                <a:tc>
+                  <a:txBody>
+                    <a:bodyPr/>
+                    <a:lstStyle/>
+                    <a:p>
+                      <a:pPr algn="ctr"/>
+                      <a:r>
+                        <a:rPr lang="fr-FR" sz="1200" dirty="0"/>
+                        <a:t>Z</a:t>
+                      </a:r>
+                      <a:endParaRPr lang="en-GB" sz="1200" dirty="0"/>
+                    </a:p>
+                  </a:txBody>
+                  <a:tcPr anchor="ctr"/>
+                </a:tc>
+                <a:extLst>
+                  <a:ext uri="{0D108BD9-81ED-4DB2-BD59-A6C34878D82A}">
+                    <a16:rowId xmlns:a16="http://schemas.microsoft.com/office/drawing/2014/main" val="2191183170"/>
+                  </a:ext>
+                </a:extLst>
+              </a:tr>
+              <a:tr h="243126">
+                <a:tc>
+                  <a:txBody>
+                    <a:bodyPr/>
+                    <a:lstStyle/>
+                    <a:p>
+                      <a:pPr algn="ctr"/>
+                      <a:r>
+                        <a:rPr lang="fr-FR" sz="1200" dirty="0"/>
+                        <a:t>a</a:t>
+                      </a:r>
+                      <a:endParaRPr lang="en-GB" sz="1200" dirty="0"/>
+                    </a:p>
+                  </a:txBody>
+                  <a:tcPr anchor="ctr"/>
+                </a:tc>
+                <a:tc>
+                  <a:txBody>
+                    <a:bodyPr/>
+                    <a:lstStyle/>
+                    <a:p>
+                      <a:pPr algn="ctr"/>
+                      <a:r>
+                        <a:rPr lang="fr-FR" sz="1200" dirty="0"/>
+                        <a:t>1.6</a:t>
+                      </a:r>
+                      <a:endParaRPr lang="en-GB" sz="1200" dirty="0"/>
+                    </a:p>
+                  </a:txBody>
+                  <a:tcPr anchor="ctr"/>
+                </a:tc>
+                <a:tc>
+                  <a:txBody>
+                    <a:bodyPr/>
+                    <a:lstStyle/>
+                    <a:p>
+                      <a:pPr algn="ctr"/>
+                      <a:r>
+                        <a:rPr lang="fr-FR" sz="1200" dirty="0"/>
+                        <a:t>2.5</a:t>
+                      </a:r>
+                      <a:endParaRPr lang="en-GB" sz="1200" dirty="0"/>
+                    </a:p>
+                  </a:txBody>
+                  <a:tcPr anchor="ctr"/>
+                </a:tc>
+                <a:extLst>
+                  <a:ext uri="{0D108BD9-81ED-4DB2-BD59-A6C34878D82A}">
+                    <a16:rowId xmlns:a16="http://schemas.microsoft.com/office/drawing/2014/main" val="3378064927"/>
+                  </a:ext>
+                </a:extLst>
+              </a:tr>
+              <a:tr h="243126">
+                <a:tc>
+                  <a:txBody>
+                    <a:bodyPr/>
+                    <a:lstStyle/>
+                    <a:p>
+                      <a:pPr algn="ctr"/>
+                      <a:r>
+                        <a:rPr lang="fr-FR" sz="1200" dirty="0"/>
+                        <a:t>b</a:t>
+                      </a:r>
+                      <a:endParaRPr lang="en-GB" sz="1200" dirty="0"/>
+                    </a:p>
+                  </a:txBody>
+                  <a:tcPr anchor="ctr"/>
+                </a:tc>
+                <a:tc>
+                  <a:txBody>
+                    <a:bodyPr/>
+                    <a:lstStyle/>
+                    <a:p>
+                      <a:pPr algn="ctr"/>
+                      <a:r>
+                        <a:rPr lang="fr-FR" sz="1200" dirty="0"/>
+                        <a:t>3.1</a:t>
+                      </a:r>
+                      <a:endParaRPr lang="en-GB" sz="1200" dirty="0"/>
+                    </a:p>
+                  </a:txBody>
+                  <a:tcPr anchor="ctr"/>
+                </a:tc>
+                <a:tc>
+                  <a:txBody>
+                    <a:bodyPr/>
+                    <a:lstStyle/>
+                    <a:p>
+                      <a:pPr algn="ctr"/>
+                      <a:r>
+                        <a:rPr lang="fr-FR" sz="1200" dirty="0"/>
+                        <a:t>4.2</a:t>
+                      </a:r>
+                      <a:endParaRPr lang="en-GB" sz="1200" dirty="0"/>
+                    </a:p>
+                  </a:txBody>
+                  <a:tcPr anchor="ctr"/>
+                </a:tc>
+                <a:extLst>
+                  <a:ext uri="{0D108BD9-81ED-4DB2-BD59-A6C34878D82A}">
+                    <a16:rowId xmlns:a16="http://schemas.microsoft.com/office/drawing/2014/main" val="2347895663"/>
+                  </a:ext>
+                </a:extLst>
+              </a:tr>
+              <a:tr h="243126">
+                <a:tc>
+                  <a:txBody>
+                    <a:bodyPr/>
+                    <a:lstStyle/>
+                    <a:p>
+                      <a:pPr algn="ctr"/>
+                      <a:r>
+                        <a:rPr lang="fr-FR" sz="1200" dirty="0"/>
+                        <a:t>c</a:t>
+                      </a:r>
+                      <a:endParaRPr lang="en-GB" sz="1200" dirty="0"/>
+                    </a:p>
+                  </a:txBody>
+                  <a:tcPr anchor="ctr"/>
+                </a:tc>
+                <a:tc>
+                  <a:txBody>
+                    <a:bodyPr/>
+                    <a:lstStyle/>
+                    <a:p>
+                      <a:pPr algn="ctr"/>
+                      <a:r>
+                        <a:rPr lang="fr-FR" sz="1200" dirty="0"/>
+                        <a:t>5.2</a:t>
+                      </a:r>
+                      <a:endParaRPr lang="en-GB" sz="1200" dirty="0"/>
+                    </a:p>
+                  </a:txBody>
+                  <a:tcPr anchor="ctr"/>
+                </a:tc>
+                <a:tc>
+                  <a:txBody>
+                    <a:bodyPr/>
+                    <a:lstStyle/>
+                    <a:p>
+                      <a:pPr algn="ctr"/>
+                      <a:r>
+                        <a:rPr lang="fr-FR" sz="1200" dirty="0"/>
+                        <a:t>6.1</a:t>
+                      </a:r>
+                      <a:endParaRPr lang="en-GB" sz="1200" dirty="0"/>
+                    </a:p>
+                  </a:txBody>
+                  <a:tcPr anchor="ctr"/>
+                </a:tc>
+                <a:extLst>
+                  <a:ext uri="{0D108BD9-81ED-4DB2-BD59-A6C34878D82A}">
+                    <a16:rowId xmlns:a16="http://schemas.microsoft.com/office/drawing/2014/main" val="3895825861"/>
+                  </a:ext>
+                </a:extLst>
+              </a:tr>
+            </a:tbl>
+          </a:graphicData>
+        </a:graphic>
+      </p:graphicFrame>
+      <p:graphicFrame>
+        <p:nvGraphicFramePr>
+          <p:cNvPr id="12" name="Table 23">
+            <a:extLst>
+              <a:ext uri="{FF2B5EF4-FFF2-40B4-BE49-F238E27FC236}">
+                <a16:creationId xmlns:a16="http://schemas.microsoft.com/office/drawing/2014/main" id="{31047720-4CC1-4A02-A821-686EA3AACBE0}"/>
+              </a:ext>
+            </a:extLst>
+          </p:cNvPr>
+          <p:cNvGraphicFramePr>
+            <a:graphicFrameLocks noGrp="1"/>
+          </p:cNvGraphicFramePr>
+          <p:nvPr>
+            <p:extLst>
+              <p:ext uri="{D42A27DB-BD31-4B8C-83A1-F6EECF244321}">
+                <p14:modId xmlns:p14="http://schemas.microsoft.com/office/powerpoint/2010/main" val="3058689083"/>
+              </p:ext>
+            </p:extLst>
+          </p:nvPr>
+        </p:nvGraphicFramePr>
+        <p:xfrm>
+          <a:off x="9284690" y="5443537"/>
+          <a:ext cx="2468880" cy="1097280"/>
+        </p:xfrm>
+        <a:graphic>
+          <a:graphicData uri="http://schemas.openxmlformats.org/drawingml/2006/table">
+            <a:tbl>
+              <a:tblPr firstRow="1">
+                <a:tableStyleId>{9D7B26C5-4107-4FEC-AEDC-1716B250A1EF}</a:tableStyleId>
+              </a:tblPr>
+              <a:tblGrid>
+                <a:gridCol w="411480">
+                  <a:extLst>
+                    <a:ext uri="{9D8B030D-6E8A-4147-A177-3AD203B41FA5}">
+                      <a16:colId xmlns:a16="http://schemas.microsoft.com/office/drawing/2014/main" val="568821903"/>
+                    </a:ext>
+                  </a:extLst>
+                </a:gridCol>
+                <a:gridCol w="411480">
+                  <a:extLst>
+                    <a:ext uri="{9D8B030D-6E8A-4147-A177-3AD203B41FA5}">
+                      <a16:colId xmlns:a16="http://schemas.microsoft.com/office/drawing/2014/main" val="2344657756"/>
+                    </a:ext>
+                  </a:extLst>
+                </a:gridCol>
+                <a:gridCol w="411480">
+                  <a:extLst>
+                    <a:ext uri="{9D8B030D-6E8A-4147-A177-3AD203B41FA5}">
+                      <a16:colId xmlns:a16="http://schemas.microsoft.com/office/drawing/2014/main" val="2698870531"/>
+                    </a:ext>
+                  </a:extLst>
+                </a:gridCol>
+                <a:gridCol w="411480">
+                  <a:extLst>
+                    <a:ext uri="{9D8B030D-6E8A-4147-A177-3AD203B41FA5}">
+                      <a16:colId xmlns:a16="http://schemas.microsoft.com/office/drawing/2014/main" val="953266028"/>
+                    </a:ext>
+                  </a:extLst>
+                </a:gridCol>
+                <a:gridCol w="411480">
+                  <a:extLst>
+                    <a:ext uri="{9D8B030D-6E8A-4147-A177-3AD203B41FA5}">
+                      <a16:colId xmlns:a16="http://schemas.microsoft.com/office/drawing/2014/main" val="3542343213"/>
+                    </a:ext>
+                  </a:extLst>
+                </a:gridCol>
+                <a:gridCol w="411480">
+                  <a:extLst>
+                    <a:ext uri="{9D8B030D-6E8A-4147-A177-3AD203B41FA5}">
+                      <a16:colId xmlns:a16="http://schemas.microsoft.com/office/drawing/2014/main" val="2466114630"/>
+                    </a:ext>
+                  </a:extLst>
+                </a:gridCol>
+              </a:tblGrid>
+              <a:tr h="189786">
+                <a:tc>
+                  <a:txBody>
+                    <a:bodyPr/>
+                    <a:lstStyle/>
+                    <a:p>
+                      <a:pPr algn="ctr"/>
+                      <a:r>
+                        <a:rPr lang="fr-FR" sz="1200" dirty="0"/>
+                        <a:t>X</a:t>
+                      </a:r>
+                      <a:endParaRPr lang="en-GB" sz="1200" dirty="0"/>
+                    </a:p>
+                  </a:txBody>
+                  <a:tcPr anchor="ctr"/>
+                </a:tc>
+                <a:tc>
+                  <a:txBody>
+                    <a:bodyPr/>
+                    <a:lstStyle/>
+                    <a:p>
+                      <a:pPr algn="ctr"/>
+                      <a:r>
+                        <a:rPr lang="fr-FR" sz="1200" dirty="0"/>
+                        <a:t>Y</a:t>
+                      </a:r>
+                      <a:endParaRPr lang="en-GB" sz="1200" dirty="0"/>
+                    </a:p>
+                  </a:txBody>
+                  <a:tcPr anchor="ctr"/>
+                </a:tc>
+                <a:tc>
+                  <a:txBody>
+                    <a:bodyPr/>
+                    <a:lstStyle/>
+                    <a:p>
+                      <a:pPr algn="ctr"/>
+                      <a:r>
+                        <a:rPr lang="fr-FR" sz="1200" dirty="0"/>
+                        <a:t>Z</a:t>
+                      </a:r>
+                      <a:endParaRPr lang="en-GB" sz="1200" dirty="0"/>
+                    </a:p>
+                  </a:txBody>
+                  <a:tcPr anchor="ctr"/>
+                </a:tc>
+                <a:tc>
+                  <a:txBody>
+                    <a:bodyPr/>
+                    <a:lstStyle/>
+                    <a:p>
+                      <a:pPr algn="ctr"/>
+                      <a:r>
+                        <a:rPr lang="fr-FR" sz="1200" dirty="0"/>
+                        <a:t>X1</a:t>
+                      </a:r>
+                      <a:endParaRPr lang="en-GB" sz="1200" dirty="0"/>
+                    </a:p>
+                  </a:txBody>
+                  <a:tcPr anchor="ctr"/>
+                </a:tc>
+                <a:tc>
+                  <a:txBody>
+                    <a:bodyPr/>
+                    <a:lstStyle/>
+                    <a:p>
+                      <a:pPr algn="ctr"/>
+                      <a:r>
+                        <a:rPr lang="fr-FR" sz="1200" dirty="0"/>
+                        <a:t>Y1</a:t>
+                      </a:r>
+                      <a:endParaRPr lang="en-GB" sz="1200" dirty="0"/>
+                    </a:p>
+                  </a:txBody>
+                  <a:tcPr anchor="ctr"/>
+                </a:tc>
+                <a:tc>
+                  <a:txBody>
+                    <a:bodyPr/>
+                    <a:lstStyle/>
+                    <a:p>
+                      <a:pPr algn="ctr"/>
+                      <a:r>
+                        <a:rPr lang="fr-FR" sz="1200" dirty="0"/>
+                        <a:t>Z1</a:t>
+                      </a:r>
+                      <a:endParaRPr lang="en-GB" sz="1200" dirty="0"/>
+                    </a:p>
+                  </a:txBody>
+                  <a:tcPr anchor="ctr"/>
+                </a:tc>
+                <a:extLst>
+                  <a:ext uri="{0D108BD9-81ED-4DB2-BD59-A6C34878D82A}">
+                    <a16:rowId xmlns:a16="http://schemas.microsoft.com/office/drawing/2014/main" val="2191183170"/>
+                  </a:ext>
+                </a:extLst>
+              </a:tr>
+              <a:tr h="189786">
+                <a:tc>
+                  <a:txBody>
+                    <a:bodyPr/>
+                    <a:lstStyle/>
+                    <a:p>
+                      <a:pPr algn="ctr"/>
+                      <a:r>
+                        <a:rPr lang="fr-FR" sz="1200" dirty="0"/>
+                        <a:t>a</a:t>
+                      </a:r>
+                      <a:endParaRPr lang="en-GB" sz="1200" dirty="0"/>
+                    </a:p>
+                  </a:txBody>
+                  <a:tcPr anchor="ctr"/>
+                </a:tc>
+                <a:tc>
+                  <a:txBody>
+                    <a:bodyPr/>
+                    <a:lstStyle/>
+                    <a:p>
+                      <a:pPr algn="ctr"/>
+                      <a:r>
+                        <a:rPr lang="fr-FR" sz="1200" dirty="0"/>
+                        <a:t>1.6</a:t>
+                      </a:r>
+                      <a:endParaRPr lang="en-GB" sz="1200" dirty="0"/>
+                    </a:p>
+                  </a:txBody>
+                  <a:tcPr anchor="ctr"/>
+                </a:tc>
+                <a:tc>
+                  <a:txBody>
+                    <a:bodyPr/>
+                    <a:lstStyle/>
+                    <a:p>
+                      <a:pPr algn="ctr"/>
+                      <a:r>
+                        <a:rPr lang="fr-FR" sz="1200" dirty="0"/>
+                        <a:t>2.5</a:t>
+                      </a:r>
+                      <a:endParaRPr lang="en-GB" sz="1200" dirty="0"/>
+                    </a:p>
+                  </a:txBody>
+                  <a:tcPr anchor="ctr"/>
+                </a:tc>
+                <a:tc>
+                  <a:txBody>
+                    <a:bodyPr/>
+                    <a:lstStyle/>
+                    <a:p>
+                      <a:pPr algn="ctr"/>
+                      <a:r>
+                        <a:rPr lang="fr-FR" sz="1200" dirty="0"/>
+                        <a:t>7.2</a:t>
+                      </a:r>
+                      <a:endParaRPr lang="en-GB" sz="1200" dirty="0"/>
+                    </a:p>
+                  </a:txBody>
+                  <a:tcPr anchor="ctr"/>
+                </a:tc>
+                <a:tc>
+                  <a:txBody>
+                    <a:bodyPr/>
+                    <a:lstStyle/>
+                    <a:p>
+                      <a:pPr algn="ctr"/>
+                      <a:r>
+                        <a:rPr lang="fr-FR" sz="1200" dirty="0"/>
+                        <a:t>1.8</a:t>
+                      </a:r>
+                      <a:endParaRPr lang="en-GB" sz="1200" dirty="0"/>
+                    </a:p>
+                  </a:txBody>
+                  <a:tcPr anchor="ctr"/>
+                </a:tc>
+                <a:tc>
+                  <a:txBody>
+                    <a:bodyPr/>
+                    <a:lstStyle/>
+                    <a:p>
+                      <a:pPr algn="ctr"/>
+                      <a:r>
+                        <a:rPr lang="fr-FR" sz="1200" dirty="0"/>
+                        <a:t>2.2</a:t>
+                      </a:r>
+                      <a:endParaRPr lang="en-GB" sz="1200" dirty="0"/>
+                    </a:p>
+                  </a:txBody>
+                  <a:tcPr anchor="ctr"/>
+                </a:tc>
+                <a:extLst>
+                  <a:ext uri="{0D108BD9-81ED-4DB2-BD59-A6C34878D82A}">
+                    <a16:rowId xmlns:a16="http://schemas.microsoft.com/office/drawing/2014/main" val="3378064927"/>
+                  </a:ext>
+                </a:extLst>
+              </a:tr>
+              <a:tr h="189786">
+                <a:tc>
+                  <a:txBody>
+                    <a:bodyPr/>
+                    <a:lstStyle/>
+                    <a:p>
+                      <a:pPr algn="ctr"/>
+                      <a:r>
+                        <a:rPr lang="fr-FR" sz="1200" dirty="0"/>
+                        <a:t>b</a:t>
+                      </a:r>
+                      <a:endParaRPr lang="en-GB" sz="1200" dirty="0"/>
+                    </a:p>
+                  </a:txBody>
+                  <a:tcPr anchor="ctr"/>
+                </a:tc>
+                <a:tc>
+                  <a:txBody>
+                    <a:bodyPr/>
+                    <a:lstStyle/>
+                    <a:p>
+                      <a:pPr algn="ctr"/>
+                      <a:r>
+                        <a:rPr lang="fr-FR" sz="1200" dirty="0"/>
+                        <a:t>3.1</a:t>
+                      </a:r>
+                      <a:endParaRPr lang="en-GB" sz="1200" dirty="0"/>
+                    </a:p>
+                  </a:txBody>
+                  <a:tcPr anchor="ctr"/>
+                </a:tc>
+                <a:tc>
+                  <a:txBody>
+                    <a:bodyPr/>
+                    <a:lstStyle/>
+                    <a:p>
+                      <a:pPr algn="ctr"/>
+                      <a:r>
+                        <a:rPr lang="fr-FR" sz="1200" dirty="0"/>
+                        <a:t>4.2</a:t>
+                      </a:r>
+                      <a:endParaRPr lang="en-GB" sz="1200" dirty="0"/>
+                    </a:p>
+                  </a:txBody>
+                  <a:tcPr anchor="ctr"/>
+                </a:tc>
+                <a:tc>
+                  <a:txBody>
+                    <a:bodyPr/>
+                    <a:lstStyle/>
+                    <a:p>
+                      <a:pPr algn="ctr"/>
+                      <a:r>
+                        <a:rPr lang="fr-FR" sz="1200" dirty="0"/>
+                        <a:t>2.1</a:t>
+                      </a:r>
+                      <a:endParaRPr lang="en-GB" sz="1200" dirty="0"/>
+                    </a:p>
+                  </a:txBody>
+                  <a:tcPr anchor="ctr"/>
+                </a:tc>
+                <a:tc>
+                  <a:txBody>
+                    <a:bodyPr/>
+                    <a:lstStyle/>
+                    <a:p>
+                      <a:pPr algn="ctr"/>
+                      <a:r>
+                        <a:rPr lang="fr-FR" sz="1200" dirty="0"/>
+                        <a:t>5.7</a:t>
+                      </a:r>
+                      <a:endParaRPr lang="en-GB" sz="1200" dirty="0"/>
+                    </a:p>
+                  </a:txBody>
+                  <a:tcPr anchor="ctr"/>
+                </a:tc>
+                <a:tc>
+                  <a:txBody>
+                    <a:bodyPr/>
+                    <a:lstStyle/>
+                    <a:p>
+                      <a:pPr algn="ctr"/>
+                      <a:r>
+                        <a:rPr lang="fr-FR" sz="1200" dirty="0"/>
+                        <a:t>3.1</a:t>
+                      </a:r>
+                      <a:endParaRPr lang="en-GB" sz="1200" dirty="0"/>
+                    </a:p>
+                  </a:txBody>
+                  <a:tcPr anchor="ctr"/>
+                </a:tc>
+                <a:extLst>
+                  <a:ext uri="{0D108BD9-81ED-4DB2-BD59-A6C34878D82A}">
+                    <a16:rowId xmlns:a16="http://schemas.microsoft.com/office/drawing/2014/main" val="2347895663"/>
+                  </a:ext>
+                </a:extLst>
+              </a:tr>
+              <a:tr h="189786">
+                <a:tc>
+                  <a:txBody>
+                    <a:bodyPr/>
+                    <a:lstStyle/>
+                    <a:p>
+                      <a:pPr algn="ctr"/>
+                      <a:r>
+                        <a:rPr lang="fr-FR" sz="1200" dirty="0"/>
+                        <a:t>c</a:t>
+                      </a:r>
+                      <a:endParaRPr lang="en-GB" sz="1200" dirty="0"/>
+                    </a:p>
+                  </a:txBody>
+                  <a:tcPr anchor="ctr"/>
+                </a:tc>
+                <a:tc>
+                  <a:txBody>
+                    <a:bodyPr/>
+                    <a:lstStyle/>
+                    <a:p>
+                      <a:pPr algn="ctr"/>
+                      <a:r>
+                        <a:rPr lang="fr-FR" sz="1200" dirty="0"/>
+                        <a:t>5.2</a:t>
+                      </a:r>
+                      <a:endParaRPr lang="en-GB" sz="1200" dirty="0"/>
+                    </a:p>
+                  </a:txBody>
+                  <a:tcPr anchor="ctr"/>
+                </a:tc>
+                <a:tc>
+                  <a:txBody>
+                    <a:bodyPr/>
+                    <a:lstStyle/>
+                    <a:p>
+                      <a:pPr algn="ctr"/>
+                      <a:r>
+                        <a:rPr lang="fr-FR" sz="1200" dirty="0"/>
+                        <a:t>6.1</a:t>
+                      </a:r>
+                      <a:endParaRPr lang="en-GB" sz="1200" dirty="0"/>
+                    </a:p>
+                  </a:txBody>
+                  <a:tcPr anchor="ctr"/>
+                </a:tc>
+                <a:tc>
+                  <a:txBody>
+                    <a:bodyPr/>
+                    <a:lstStyle/>
+                    <a:p>
+                      <a:pPr algn="ctr"/>
+                      <a:r>
+                        <a:rPr lang="fr-FR" sz="1200" dirty="0"/>
+                        <a:t>5.8</a:t>
+                      </a:r>
+                      <a:endParaRPr lang="en-GB" sz="1200" dirty="0"/>
+                    </a:p>
+                  </a:txBody>
+                  <a:tcPr anchor="ctr"/>
+                </a:tc>
+                <a:tc>
+                  <a:txBody>
+                    <a:bodyPr/>
+                    <a:lstStyle/>
+                    <a:p>
+                      <a:pPr algn="ctr"/>
+                      <a:r>
+                        <a:rPr lang="fr-FR" sz="1200" dirty="0"/>
+                        <a:t>2.4</a:t>
+                      </a:r>
+                      <a:endParaRPr lang="en-GB" sz="1200" dirty="0"/>
+                    </a:p>
+                  </a:txBody>
+                  <a:tcPr anchor="ctr"/>
+                </a:tc>
+                <a:tc>
+                  <a:txBody>
+                    <a:bodyPr/>
+                    <a:lstStyle/>
+                    <a:p>
+                      <a:pPr algn="ctr"/>
+                      <a:r>
+                        <a:rPr lang="fr-FR" sz="1200" dirty="0"/>
+                        <a:t>8.2</a:t>
+                      </a:r>
+                      <a:endParaRPr lang="en-GB" sz="1200" dirty="0"/>
+                    </a:p>
+                  </a:txBody>
+                  <a:tcPr anchor="ctr"/>
+                </a:tc>
+                <a:extLst>
+                  <a:ext uri="{0D108BD9-81ED-4DB2-BD59-A6C34878D82A}">
+                    <a16:rowId xmlns:a16="http://schemas.microsoft.com/office/drawing/2014/main" val="3895825861"/>
+                  </a:ext>
+                </a:extLst>
+              </a:tr>
+            </a:tbl>
+          </a:graphicData>
+        </a:graphic>
+      </p:graphicFrame>
+      <p:cxnSp>
+        <p:nvCxnSpPr>
+          <p:cNvPr id="13" name="Straight Arrow Connector 12">
+            <a:extLst>
+              <a:ext uri="{FF2B5EF4-FFF2-40B4-BE49-F238E27FC236}">
+                <a16:creationId xmlns:a16="http://schemas.microsoft.com/office/drawing/2014/main" id="{843F7F33-7FA8-44ED-A0BB-0D8CA5302ECA}"/>
+              </a:ext>
+            </a:extLst>
+          </p:cNvPr>
+          <p:cNvCxnSpPr>
+            <a:cxnSpLocks/>
+            <a:stCxn id="2" idx="3"/>
+          </p:cNvCxnSpPr>
+          <p:nvPr/>
+        </p:nvCxnSpPr>
+        <p:spPr>
+          <a:xfrm flipV="1">
+            <a:off x="6717982" y="1066708"/>
+            <a:ext cx="2566138" cy="2362293"/>
+          </a:xfrm>
+          <a:prstGeom prst="straightConnector1">
+            <a:avLst/>
+          </a:prstGeom>
+          <a:ln w="57150">
+            <a:tailEnd type="triangle"/>
+          </a:ln>
+        </p:spPr>
+        <p:style>
+          <a:lnRef idx="1">
+            <a:schemeClr val="dk1"/>
+          </a:lnRef>
+          <a:fillRef idx="0">
+            <a:schemeClr val="dk1"/>
+          </a:fillRef>
+          <a:effectRef idx="0">
+            <a:schemeClr val="dk1"/>
+          </a:effectRef>
+          <a:fontRef idx="minor">
+            <a:schemeClr val="tx1"/>
+          </a:fontRef>
+        </p:style>
+      </p:cxnSp>
+      <p:cxnSp>
+        <p:nvCxnSpPr>
+          <p:cNvPr id="14" name="Straight Arrow Connector 13">
+            <a:extLst>
+              <a:ext uri="{FF2B5EF4-FFF2-40B4-BE49-F238E27FC236}">
+                <a16:creationId xmlns:a16="http://schemas.microsoft.com/office/drawing/2014/main" id="{54904CA5-4818-42A5-BA35-C7EDCD21ED8F}"/>
+              </a:ext>
+            </a:extLst>
+          </p:cNvPr>
+          <p:cNvCxnSpPr>
+            <a:cxnSpLocks/>
+            <a:endCxn id="10" idx="1"/>
+          </p:cNvCxnSpPr>
+          <p:nvPr/>
+        </p:nvCxnSpPr>
+        <p:spPr>
+          <a:xfrm>
+            <a:off x="8407082" y="1904652"/>
+            <a:ext cx="874589" cy="864165"/>
+          </a:xfrm>
+          <a:prstGeom prst="straightConnector1">
+            <a:avLst/>
+          </a:prstGeom>
+          <a:ln w="19050">
+            <a:prstDash val="solid"/>
+            <a:tailEnd type="triangle"/>
+          </a:ln>
+        </p:spPr>
+        <p:style>
+          <a:lnRef idx="1">
+            <a:schemeClr val="dk1"/>
+          </a:lnRef>
+          <a:fillRef idx="0">
+            <a:schemeClr val="dk1"/>
+          </a:fillRef>
+          <a:effectRef idx="0">
+            <a:schemeClr val="dk1"/>
+          </a:effectRef>
+          <a:fontRef idx="minor">
+            <a:schemeClr val="tx1"/>
+          </a:fontRef>
+        </p:style>
+      </p:cxnSp>
+      <p:cxnSp>
+        <p:nvCxnSpPr>
+          <p:cNvPr id="16" name="Straight Arrow Connector 15">
+            <a:extLst>
+              <a:ext uri="{FF2B5EF4-FFF2-40B4-BE49-F238E27FC236}">
+                <a16:creationId xmlns:a16="http://schemas.microsoft.com/office/drawing/2014/main" id="{ED08C7B1-DF18-408D-9B62-F74376258153}"/>
+              </a:ext>
+            </a:extLst>
+          </p:cNvPr>
+          <p:cNvCxnSpPr>
+            <a:cxnSpLocks/>
+            <a:stCxn id="2" idx="3"/>
+            <a:endCxn id="12" idx="1"/>
+          </p:cNvCxnSpPr>
+          <p:nvPr/>
+        </p:nvCxnSpPr>
+        <p:spPr>
+          <a:xfrm>
+            <a:off x="6717982" y="3429001"/>
+            <a:ext cx="2566708" cy="2563176"/>
+          </a:xfrm>
+          <a:prstGeom prst="straightConnector1">
+            <a:avLst/>
+          </a:prstGeom>
+          <a:ln w="19050">
+            <a:prstDash val="solid"/>
+            <a:tailEnd type="triangle"/>
+          </a:ln>
+        </p:spPr>
+        <p:style>
+          <a:lnRef idx="1">
+            <a:schemeClr val="dk1"/>
+          </a:lnRef>
+          <a:fillRef idx="0">
+            <a:schemeClr val="dk1"/>
+          </a:fillRef>
+          <a:effectRef idx="0">
+            <a:schemeClr val="dk1"/>
+          </a:effectRef>
+          <a:fontRef idx="minor">
+            <a:schemeClr val="tx1"/>
+          </a:fontRef>
+        </p:style>
+      </p:cxnSp>
+      <p:sp>
+        <p:nvSpPr>
+          <p:cNvPr id="17" name="Rectangle 16">
+            <a:extLst>
+              <a:ext uri="{FF2B5EF4-FFF2-40B4-BE49-F238E27FC236}">
+                <a16:creationId xmlns:a16="http://schemas.microsoft.com/office/drawing/2014/main" id="{5CF83B80-DC1A-4CFD-8486-E4D3CD1D1FD2}"/>
+              </a:ext>
+            </a:extLst>
+          </p:cNvPr>
+          <p:cNvSpPr/>
+          <p:nvPr/>
+        </p:nvSpPr>
+        <p:spPr>
+          <a:xfrm rot="19038493">
+            <a:off x="6541489" y="1714966"/>
+            <a:ext cx="2592721" cy="722648"/>
+          </a:xfrm>
+          <a:prstGeom prst="rect">
+            <a:avLst/>
+          </a:prstGeom>
+          <a:noFill/>
+          <a:ln>
+            <a:noFill/>
+          </a:ln>
+        </p:spPr>
+        <p:style>
+          <a:lnRef idx="0">
+            <a:scrgbClr r="0" g="0" b="0"/>
+          </a:lnRef>
+          <a:fillRef idx="0">
+            <a:scrgbClr r="0" g="0" b="0"/>
+          </a:fillRef>
+          <a:effectRef idx="0">
+            <a:scrgbClr r="0" g="0" b="0"/>
+          </a:effectRef>
+          <a:fontRef idx="minor">
+            <a:schemeClr val="dk1"/>
+          </a:fontRef>
+        </p:style>
+        <p:txBody>
+          <a:bodyPr rtlCol="0" anchor="ctr"/>
+          <a:lstStyle/>
+          <a:p>
+            <a:pPr algn="ctr"/>
+            <a:r>
+              <a:rPr lang="fr-FR" sz="2200" b="1" dirty="0" err="1">
+                <a:solidFill>
+                  <a:srgbClr val="F6591A"/>
+                </a:solidFill>
+                <a:latin typeface="Consolas" panose="020B0609020204030204" pitchFamily="49" charset="0"/>
+              </a:rPr>
+              <a:t>print</a:t>
+            </a:r>
+            <a:r>
+              <a:rPr lang="fr-FR" sz="2200" b="1" dirty="0">
+                <a:solidFill>
+                  <a:srgbClr val="F6591A"/>
+                </a:solidFill>
+                <a:latin typeface="Consolas" panose="020B0609020204030204" pitchFamily="49" charset="0"/>
+              </a:rPr>
+              <a:t>()</a:t>
+            </a:r>
+            <a:endParaRPr lang="en-GB" sz="2200" b="1" dirty="0">
+              <a:solidFill>
+                <a:srgbClr val="F6591A"/>
+              </a:solidFill>
+              <a:latin typeface="Consolas" panose="020B0609020204030204" pitchFamily="49" charset="0"/>
+            </a:endParaRPr>
+          </a:p>
+        </p:txBody>
+      </p:sp>
+      <p:sp>
+        <p:nvSpPr>
+          <p:cNvPr id="18" name="Rectangle 17">
+            <a:extLst>
+              <a:ext uri="{FF2B5EF4-FFF2-40B4-BE49-F238E27FC236}">
+                <a16:creationId xmlns:a16="http://schemas.microsoft.com/office/drawing/2014/main" id="{C6971468-409E-4FBC-A450-971BE4F3F716}"/>
+              </a:ext>
+            </a:extLst>
+          </p:cNvPr>
+          <p:cNvSpPr/>
+          <p:nvPr/>
+        </p:nvSpPr>
+        <p:spPr>
+          <a:xfrm rot="18927848">
+            <a:off x="7352215" y="4175218"/>
+            <a:ext cx="2592721" cy="693420"/>
+          </a:xfrm>
+          <a:prstGeom prst="rect">
+            <a:avLst/>
+          </a:prstGeom>
+          <a:noFill/>
+          <a:ln>
+            <a:noFill/>
+          </a:ln>
+        </p:spPr>
+        <p:style>
+          <a:lnRef idx="0">
+            <a:scrgbClr r="0" g="0" b="0"/>
+          </a:lnRef>
+          <a:fillRef idx="0">
+            <a:scrgbClr r="0" g="0" b="0"/>
+          </a:fillRef>
+          <a:effectRef idx="0">
+            <a:scrgbClr r="0" g="0" b="0"/>
+          </a:effectRef>
+          <a:fontRef idx="minor">
+            <a:schemeClr val="dk1"/>
+          </a:fontRef>
+        </p:style>
+        <p:txBody>
+          <a:bodyPr rtlCol="0" anchor="ctr"/>
+          <a:lstStyle/>
+          <a:p>
+            <a:pPr algn="ctr"/>
+            <a:r>
+              <a:rPr lang="fr-FR" sz="1600" dirty="0" err="1">
+                <a:solidFill>
+                  <a:srgbClr val="F6591A"/>
+                </a:solidFill>
+                <a:latin typeface="Consolas" panose="020B0609020204030204" pitchFamily="49" charset="0"/>
+              </a:rPr>
+              <a:t>summary</a:t>
+            </a:r>
+            <a:r>
+              <a:rPr lang="fr-FR" sz="1600" dirty="0">
+                <a:solidFill>
+                  <a:srgbClr val="F6591A"/>
+                </a:solidFill>
+                <a:latin typeface="Consolas" panose="020B0609020204030204" pitchFamily="49" charset="0"/>
+              </a:rPr>
+              <a:t>()</a:t>
+            </a:r>
+            <a:endParaRPr lang="en-GB" sz="1600" dirty="0">
+              <a:solidFill>
+                <a:srgbClr val="F6591A"/>
+              </a:solidFill>
+              <a:latin typeface="Consolas" panose="020B0609020204030204" pitchFamily="49" charset="0"/>
+            </a:endParaRPr>
+          </a:p>
+        </p:txBody>
+      </p:sp>
+      <p:sp>
+        <p:nvSpPr>
+          <p:cNvPr id="20" name="Rectangle 19">
+            <a:extLst>
+              <a:ext uri="{FF2B5EF4-FFF2-40B4-BE49-F238E27FC236}">
+                <a16:creationId xmlns:a16="http://schemas.microsoft.com/office/drawing/2014/main" id="{72D286BD-15C2-4896-92AE-1361296C7145}"/>
+              </a:ext>
+            </a:extLst>
+          </p:cNvPr>
+          <p:cNvSpPr/>
+          <p:nvPr/>
+        </p:nvSpPr>
+        <p:spPr>
+          <a:xfrm rot="2666436">
+            <a:off x="5711779" y="4565719"/>
+            <a:ext cx="4466681" cy="693420"/>
+          </a:xfrm>
+          <a:prstGeom prst="rect">
+            <a:avLst/>
+          </a:prstGeom>
+          <a:noFill/>
+          <a:ln>
+            <a:noFill/>
+          </a:ln>
+        </p:spPr>
+        <p:style>
+          <a:lnRef idx="0">
+            <a:scrgbClr r="0" g="0" b="0"/>
+          </a:lnRef>
+          <a:fillRef idx="0">
+            <a:scrgbClr r="0" g="0" b="0"/>
+          </a:fillRef>
+          <a:effectRef idx="0">
+            <a:scrgbClr r="0" g="0" b="0"/>
+          </a:effectRef>
+          <a:fontRef idx="minor">
+            <a:schemeClr val="dk1"/>
+          </a:fontRef>
+        </p:style>
+        <p:txBody>
+          <a:bodyPr rtlCol="0" anchor="ctr"/>
+          <a:lstStyle/>
+          <a:p>
+            <a:pPr algn="ctr"/>
+            <a:r>
+              <a:rPr lang="fr-FR" sz="2200" b="1" dirty="0" err="1">
+                <a:solidFill>
+                  <a:srgbClr val="F6591A"/>
+                </a:solidFill>
+                <a:latin typeface="Consolas" panose="020B0609020204030204" pitchFamily="49" charset="0"/>
+              </a:rPr>
+              <a:t>as.data.frame</a:t>
+            </a:r>
+            <a:r>
+              <a:rPr lang="fr-FR" sz="2200" b="1" dirty="0">
+                <a:solidFill>
+                  <a:srgbClr val="F6591A"/>
+                </a:solidFill>
+                <a:latin typeface="Consolas" panose="020B0609020204030204" pitchFamily="49" charset="0"/>
+              </a:rPr>
+              <a:t>()</a:t>
+            </a:r>
+            <a:endParaRPr lang="en-GB" sz="2200" b="1" dirty="0">
+              <a:solidFill>
+                <a:srgbClr val="F6591A"/>
+              </a:solidFill>
+              <a:latin typeface="Consolas" panose="020B0609020204030204" pitchFamily="49" charset="0"/>
+            </a:endParaRPr>
+          </a:p>
+        </p:txBody>
+      </p:sp>
+      <p:sp>
+        <p:nvSpPr>
+          <p:cNvPr id="21" name="Rectangle 20">
+            <a:extLst>
+              <a:ext uri="{FF2B5EF4-FFF2-40B4-BE49-F238E27FC236}">
+                <a16:creationId xmlns:a16="http://schemas.microsoft.com/office/drawing/2014/main" id="{8E50F20B-C340-455F-A7BB-6EEC56DC6B0E}"/>
+              </a:ext>
+            </a:extLst>
+          </p:cNvPr>
+          <p:cNvSpPr/>
+          <p:nvPr/>
+        </p:nvSpPr>
+        <p:spPr>
+          <a:xfrm>
+            <a:off x="5589910" y="825914"/>
+            <a:ext cx="2930845" cy="693420"/>
+          </a:xfrm>
+          <a:prstGeom prst="rect">
+            <a:avLst/>
+          </a:prstGeom>
+          <a:noFill/>
+          <a:ln>
+            <a:noFill/>
+          </a:ln>
+        </p:spPr>
+        <p:style>
+          <a:lnRef idx="0">
+            <a:scrgbClr r="0" g="0" b="0"/>
+          </a:lnRef>
+          <a:fillRef idx="0">
+            <a:scrgbClr r="0" g="0" b="0"/>
+          </a:fillRef>
+          <a:effectRef idx="0">
+            <a:scrgbClr r="0" g="0" b="0"/>
+          </a:effectRef>
+          <a:fontRef idx="minor">
+            <a:schemeClr val="dk1"/>
+          </a:fontRef>
+        </p:style>
+        <p:txBody>
+          <a:bodyPr rtlCol="0" anchor="ctr"/>
+          <a:lstStyle/>
+          <a:p>
+            <a:pPr algn="ctr"/>
+            <a:r>
+              <a:rPr lang="fr-FR" sz="1600" i="1" dirty="0">
+                <a:solidFill>
+                  <a:schemeClr val="bg2">
+                    <a:lumMod val="75000"/>
+                  </a:schemeClr>
+                </a:solidFill>
+              </a:rPr>
+              <a:t>default output</a:t>
+            </a:r>
+            <a:endParaRPr lang="en-GB" sz="1600" i="1" dirty="0">
+              <a:solidFill>
+                <a:schemeClr val="bg2">
+                  <a:lumMod val="75000"/>
+                </a:schemeClr>
+              </a:solidFill>
+            </a:endParaRPr>
+          </a:p>
+        </p:txBody>
+      </p:sp>
+      <p:sp>
+        <p:nvSpPr>
+          <p:cNvPr id="36" name="Rectangle 35">
+            <a:extLst>
+              <a:ext uri="{FF2B5EF4-FFF2-40B4-BE49-F238E27FC236}">
+                <a16:creationId xmlns:a16="http://schemas.microsoft.com/office/drawing/2014/main" id="{A22DC0D7-C60B-406A-A397-256ECCD5DCF4}"/>
+              </a:ext>
+            </a:extLst>
+          </p:cNvPr>
+          <p:cNvSpPr/>
+          <p:nvPr/>
+        </p:nvSpPr>
+        <p:spPr>
+          <a:xfrm rot="2643285">
+            <a:off x="7448437" y="2114578"/>
+            <a:ext cx="2592721" cy="693420"/>
+          </a:xfrm>
+          <a:prstGeom prst="rect">
+            <a:avLst/>
+          </a:prstGeom>
+          <a:noFill/>
+          <a:ln>
+            <a:noFill/>
+          </a:ln>
+        </p:spPr>
+        <p:style>
+          <a:lnRef idx="0">
+            <a:scrgbClr r="0" g="0" b="0"/>
+          </a:lnRef>
+          <a:fillRef idx="0">
+            <a:scrgbClr r="0" g="0" b="0"/>
+          </a:fillRef>
+          <a:effectRef idx="0">
+            <a:scrgbClr r="0" g="0" b="0"/>
+          </a:effectRef>
+          <a:fontRef idx="minor">
+            <a:schemeClr val="dk1"/>
+          </a:fontRef>
+        </p:style>
+        <p:txBody>
+          <a:bodyPr rtlCol="0" anchor="ctr"/>
+          <a:lstStyle/>
+          <a:p>
+            <a:pPr algn="ctr"/>
+            <a:r>
+              <a:rPr lang="fr-FR" sz="1600" dirty="0" err="1">
+                <a:solidFill>
+                  <a:srgbClr val="F6591A"/>
+                </a:solidFill>
+                <a:latin typeface="Consolas" panose="020B0609020204030204" pitchFamily="49" charset="0"/>
+              </a:rPr>
+              <a:t>summary</a:t>
+            </a:r>
+            <a:r>
+              <a:rPr lang="fr-FR" sz="1600" dirty="0">
+                <a:solidFill>
+                  <a:srgbClr val="F6591A"/>
+                </a:solidFill>
+                <a:latin typeface="Consolas" panose="020B0609020204030204" pitchFamily="49" charset="0"/>
+              </a:rPr>
+              <a:t>()</a:t>
+            </a:r>
+            <a:endParaRPr lang="en-GB" sz="1600" dirty="0">
+              <a:solidFill>
+                <a:srgbClr val="F6591A"/>
+              </a:solidFill>
+              <a:latin typeface="Consolas" panose="020B0609020204030204" pitchFamily="49" charset="0"/>
+            </a:endParaRPr>
+          </a:p>
+        </p:txBody>
+      </p:sp>
+      <p:grpSp>
+        <p:nvGrpSpPr>
+          <p:cNvPr id="55" name="Group 54">
+            <a:extLst>
+              <a:ext uri="{FF2B5EF4-FFF2-40B4-BE49-F238E27FC236}">
+                <a16:creationId xmlns:a16="http://schemas.microsoft.com/office/drawing/2014/main" id="{5843595B-27F5-46CA-AA5F-CA5A1E205FB9}"/>
+              </a:ext>
+            </a:extLst>
+          </p:cNvPr>
+          <p:cNvGrpSpPr/>
+          <p:nvPr/>
+        </p:nvGrpSpPr>
+        <p:grpSpPr>
+          <a:xfrm flipV="1">
+            <a:off x="5263957" y="4251869"/>
+            <a:ext cx="682777" cy="1539422"/>
+            <a:chOff x="1747410" y="4538865"/>
+            <a:chExt cx="682777" cy="1539422"/>
+          </a:xfrm>
+        </p:grpSpPr>
+        <p:cxnSp>
+          <p:nvCxnSpPr>
+            <p:cNvPr id="45" name="Straight Arrow Connector 44">
+              <a:extLst>
+                <a:ext uri="{FF2B5EF4-FFF2-40B4-BE49-F238E27FC236}">
+                  <a16:creationId xmlns:a16="http://schemas.microsoft.com/office/drawing/2014/main" id="{A19FD724-6940-4998-95E7-C37828548DD4}"/>
+                </a:ext>
+              </a:extLst>
+            </p:cNvPr>
+            <p:cNvCxnSpPr>
+              <a:cxnSpLocks/>
+            </p:cNvCxnSpPr>
+            <p:nvPr/>
+          </p:nvCxnSpPr>
+          <p:spPr>
+            <a:xfrm flipH="1" flipV="1">
+              <a:off x="1761025" y="4538865"/>
+              <a:ext cx="669162" cy="619868"/>
+            </a:xfrm>
+            <a:prstGeom prst="straightConnector1">
+              <a:avLst/>
+            </a:prstGeom>
+            <a:ln w="19050">
+              <a:prstDash val="solid"/>
+              <a:tailEnd type="triangle"/>
+            </a:ln>
+          </p:spPr>
+          <p:style>
+            <a:lnRef idx="1">
+              <a:schemeClr val="dk1"/>
+            </a:lnRef>
+            <a:fillRef idx="0">
+              <a:schemeClr val="dk1"/>
+            </a:fillRef>
+            <a:effectRef idx="0">
+              <a:schemeClr val="dk1"/>
+            </a:effectRef>
+            <a:fontRef idx="minor">
+              <a:schemeClr val="tx1"/>
+            </a:fontRef>
+          </p:style>
+        </p:cxnSp>
+        <p:cxnSp>
+          <p:nvCxnSpPr>
+            <p:cNvPr id="51" name="Straight Arrow Connector 50">
+              <a:extLst>
+                <a:ext uri="{FF2B5EF4-FFF2-40B4-BE49-F238E27FC236}">
+                  <a16:creationId xmlns:a16="http://schemas.microsoft.com/office/drawing/2014/main" id="{A85FFC18-7EAA-495C-90EE-344E5C55D3BB}"/>
+                </a:ext>
+              </a:extLst>
+            </p:cNvPr>
+            <p:cNvCxnSpPr>
+              <a:cxnSpLocks/>
+            </p:cNvCxnSpPr>
+            <p:nvPr/>
+          </p:nvCxnSpPr>
+          <p:spPr>
+            <a:xfrm flipH="1" flipV="1">
+              <a:off x="1761025" y="4845383"/>
+              <a:ext cx="669162" cy="619868"/>
+            </a:xfrm>
+            <a:prstGeom prst="straightConnector1">
+              <a:avLst/>
+            </a:prstGeom>
+            <a:ln w="19050">
+              <a:prstDash val="solid"/>
+              <a:tailEnd type="triangle"/>
+            </a:ln>
+          </p:spPr>
+          <p:style>
+            <a:lnRef idx="1">
+              <a:schemeClr val="dk1"/>
+            </a:lnRef>
+            <a:fillRef idx="0">
+              <a:schemeClr val="dk1"/>
+            </a:fillRef>
+            <a:effectRef idx="0">
+              <a:schemeClr val="dk1"/>
+            </a:effectRef>
+            <a:fontRef idx="minor">
+              <a:schemeClr val="tx1"/>
+            </a:fontRef>
+          </p:style>
+        </p:cxnSp>
+        <p:cxnSp>
+          <p:nvCxnSpPr>
+            <p:cNvPr id="52" name="Straight Arrow Connector 51">
+              <a:extLst>
+                <a:ext uri="{FF2B5EF4-FFF2-40B4-BE49-F238E27FC236}">
+                  <a16:creationId xmlns:a16="http://schemas.microsoft.com/office/drawing/2014/main" id="{8EA82F50-9B8D-468D-A925-2F9DF21C3D64}"/>
+                </a:ext>
+              </a:extLst>
+            </p:cNvPr>
+            <p:cNvCxnSpPr>
+              <a:cxnSpLocks/>
+            </p:cNvCxnSpPr>
+            <p:nvPr/>
+          </p:nvCxnSpPr>
+          <p:spPr>
+            <a:xfrm flipH="1" flipV="1">
+              <a:off x="1761025" y="5151901"/>
+              <a:ext cx="669162" cy="619868"/>
+            </a:xfrm>
+            <a:prstGeom prst="straightConnector1">
+              <a:avLst/>
+            </a:prstGeom>
+            <a:ln w="19050">
+              <a:prstDash val="solid"/>
+              <a:tailEnd type="triangle"/>
+            </a:ln>
+          </p:spPr>
+          <p:style>
+            <a:lnRef idx="1">
+              <a:schemeClr val="dk1"/>
+            </a:lnRef>
+            <a:fillRef idx="0">
+              <a:schemeClr val="dk1"/>
+            </a:fillRef>
+            <a:effectRef idx="0">
+              <a:schemeClr val="dk1"/>
+            </a:effectRef>
+            <a:fontRef idx="minor">
+              <a:schemeClr val="tx1"/>
+            </a:fontRef>
+          </p:style>
+        </p:cxnSp>
+        <p:cxnSp>
+          <p:nvCxnSpPr>
+            <p:cNvPr id="53" name="Straight Arrow Connector 52">
+              <a:extLst>
+                <a:ext uri="{FF2B5EF4-FFF2-40B4-BE49-F238E27FC236}">
+                  <a16:creationId xmlns:a16="http://schemas.microsoft.com/office/drawing/2014/main" id="{180A947E-DA0D-4096-9CC3-B4462E20C103}"/>
+                </a:ext>
+              </a:extLst>
+            </p:cNvPr>
+            <p:cNvCxnSpPr>
+              <a:cxnSpLocks/>
+            </p:cNvCxnSpPr>
+            <p:nvPr/>
+          </p:nvCxnSpPr>
+          <p:spPr>
+            <a:xfrm flipH="1" flipV="1">
+              <a:off x="1747410" y="5458419"/>
+              <a:ext cx="669162" cy="619868"/>
+            </a:xfrm>
+            <a:prstGeom prst="straightConnector1">
+              <a:avLst/>
+            </a:prstGeom>
+            <a:ln w="19050">
+              <a:prstDash val="solid"/>
+              <a:tailEnd type="triangle"/>
+            </a:ln>
+          </p:spPr>
+          <p:style>
+            <a:lnRef idx="1">
+              <a:schemeClr val="dk1"/>
+            </a:lnRef>
+            <a:fillRef idx="0">
+              <a:schemeClr val="dk1"/>
+            </a:fillRef>
+            <a:effectRef idx="0">
+              <a:schemeClr val="dk1"/>
+            </a:effectRef>
+            <a:fontRef idx="minor">
+              <a:schemeClr val="tx1"/>
+            </a:fontRef>
+          </p:style>
+        </p:cxnSp>
+      </p:grpSp>
+      <p:sp>
+        <p:nvSpPr>
+          <p:cNvPr id="57" name="Rectangle 56">
+            <a:extLst>
+              <a:ext uri="{FF2B5EF4-FFF2-40B4-BE49-F238E27FC236}">
+                <a16:creationId xmlns:a16="http://schemas.microsoft.com/office/drawing/2014/main" id="{88691DD5-867B-40B1-A498-6AD8BAABB524}"/>
+              </a:ext>
+            </a:extLst>
+          </p:cNvPr>
+          <p:cNvSpPr/>
+          <p:nvPr/>
+        </p:nvSpPr>
+        <p:spPr>
+          <a:xfrm>
+            <a:off x="2289731" y="158514"/>
+            <a:ext cx="3272645" cy="1816389"/>
+          </a:xfrm>
+          <a:prstGeom prst="rect">
+            <a:avLst/>
+          </a:prstGeom>
+          <a:solidFill>
+            <a:srgbClr val="26B999">
+              <a:alpha val="10196"/>
+            </a:srgbClr>
+          </a:solidFill>
+          <a:ln>
+            <a:noFill/>
+          </a:ln>
+        </p:spPr>
+        <p:style>
+          <a:lnRef idx="0">
+            <a:scrgbClr r="0" g="0" b="0"/>
+          </a:lnRef>
+          <a:fillRef idx="0">
+            <a:scrgbClr r="0" g="0" b="0"/>
+          </a:fillRef>
+          <a:effectRef idx="0">
+            <a:scrgbClr r="0" g="0" b="0"/>
+          </a:effectRef>
+          <a:fontRef idx="minor">
+            <a:schemeClr val="dk1"/>
+          </a:fontRef>
+        </p:style>
+        <p:txBody>
+          <a:bodyPr rtlCol="0" anchor="ctr"/>
+          <a:lstStyle/>
+          <a:p>
+            <a:r>
+              <a:rPr lang="fr-FR" sz="2000" b="1" i="1" dirty="0" err="1">
+                <a:solidFill>
+                  <a:schemeClr val="bg1">
+                    <a:lumMod val="50000"/>
+                  </a:schemeClr>
+                </a:solidFill>
+              </a:rPr>
+              <a:t>Specific</a:t>
+            </a:r>
+            <a:r>
+              <a:rPr lang="fr-FR" sz="2000" b="1" i="1" dirty="0">
+                <a:solidFill>
+                  <a:schemeClr val="bg1">
+                    <a:lumMod val="50000"/>
+                  </a:schemeClr>
+                </a:solidFill>
+              </a:rPr>
+              <a:t> reports:</a:t>
+            </a:r>
+          </a:p>
+          <a:p>
+            <a:pPr marL="342900" indent="-342900">
+              <a:buFont typeface="Calibri" panose="020F0502020204030204" pitchFamily="34" charset="0"/>
+              <a:buChar char="‒"/>
+            </a:pPr>
+            <a:r>
+              <a:rPr lang="fr-FR" b="1" i="1" dirty="0" err="1">
+                <a:solidFill>
+                  <a:srgbClr val="F6591A"/>
+                </a:solidFill>
+                <a:latin typeface="Consolas" panose="020B0609020204030204" pitchFamily="49" charset="0"/>
+              </a:rPr>
+              <a:t>report_participants</a:t>
+            </a:r>
+            <a:r>
+              <a:rPr lang="fr-FR" b="1" i="1" dirty="0">
+                <a:solidFill>
+                  <a:srgbClr val="F6591A"/>
+                </a:solidFill>
+                <a:latin typeface="Consolas" panose="020B0609020204030204" pitchFamily="49" charset="0"/>
+              </a:rPr>
+              <a:t>()</a:t>
+            </a:r>
+          </a:p>
+          <a:p>
+            <a:pPr marL="342900" indent="-342900">
+              <a:buFont typeface="Calibri" panose="020F0502020204030204" pitchFamily="34" charset="0"/>
+              <a:buChar char="‒"/>
+            </a:pPr>
+            <a:r>
+              <a:rPr lang="fr-FR" b="1" i="1" dirty="0" err="1">
+                <a:solidFill>
+                  <a:srgbClr val="F6591A"/>
+                </a:solidFill>
+                <a:latin typeface="Consolas" panose="020B0609020204030204" pitchFamily="49" charset="0"/>
+              </a:rPr>
+              <a:t>report_sample</a:t>
+            </a:r>
+            <a:r>
+              <a:rPr lang="fr-FR" b="1" i="1" dirty="0">
+                <a:solidFill>
+                  <a:srgbClr val="F6591A"/>
+                </a:solidFill>
+                <a:latin typeface="Consolas" panose="020B0609020204030204" pitchFamily="49" charset="0"/>
+              </a:rPr>
+              <a:t>()</a:t>
+            </a:r>
+          </a:p>
+          <a:p>
+            <a:pPr marL="342900" indent="-342900">
+              <a:buFont typeface="Calibri" panose="020F0502020204030204" pitchFamily="34" charset="0"/>
+              <a:buChar char="‒"/>
+            </a:pPr>
+            <a:r>
+              <a:rPr lang="en-GB" b="1" i="1" dirty="0" err="1">
+                <a:solidFill>
+                  <a:srgbClr val="F6591A"/>
+                </a:solidFill>
+                <a:latin typeface="Consolas" panose="020B0609020204030204" pitchFamily="49" charset="0"/>
+              </a:rPr>
+              <a:t>report_system</a:t>
+            </a:r>
+            <a:r>
+              <a:rPr lang="en-GB" b="1" i="1" dirty="0">
+                <a:solidFill>
+                  <a:srgbClr val="F6591A"/>
+                </a:solidFill>
+                <a:latin typeface="Consolas" panose="020B0609020204030204" pitchFamily="49" charset="0"/>
+              </a:rPr>
+              <a:t>()</a:t>
+            </a:r>
+            <a:endParaRPr lang="fr-FR" b="1" i="1" dirty="0">
+              <a:solidFill>
+                <a:srgbClr val="F6591A"/>
+              </a:solidFill>
+              <a:latin typeface="Consolas" panose="020B0609020204030204" pitchFamily="49" charset="0"/>
+            </a:endParaRPr>
+          </a:p>
+          <a:p>
+            <a:pPr marL="342900" indent="-342900">
+              <a:buFont typeface="Calibri" panose="020F0502020204030204" pitchFamily="34" charset="0"/>
+              <a:buChar char="‒"/>
+            </a:pPr>
+            <a:r>
+              <a:rPr lang="fr-FR" b="1" i="1" dirty="0" err="1">
+                <a:solidFill>
+                  <a:srgbClr val="F6591A"/>
+                </a:solidFill>
+                <a:latin typeface="Consolas" panose="020B0609020204030204" pitchFamily="49" charset="0"/>
+              </a:rPr>
+              <a:t>report_packages</a:t>
+            </a:r>
+            <a:r>
+              <a:rPr lang="fr-FR" b="1" i="1" dirty="0">
+                <a:solidFill>
+                  <a:srgbClr val="F6591A"/>
+                </a:solidFill>
+                <a:latin typeface="Consolas" panose="020B0609020204030204" pitchFamily="49" charset="0"/>
+              </a:rPr>
+              <a:t>()</a:t>
+            </a:r>
+          </a:p>
+          <a:p>
+            <a:pPr marL="342900" indent="-342900">
+              <a:buFont typeface="Calibri" panose="020F0502020204030204" pitchFamily="34" charset="0"/>
+              <a:buChar char="‒"/>
+            </a:pPr>
+            <a:r>
+              <a:rPr lang="en-GB" b="1" i="1" dirty="0">
+                <a:solidFill>
+                  <a:srgbClr val="F6591A"/>
+                </a:solidFill>
+                <a:latin typeface="Consolas" panose="020B0609020204030204" pitchFamily="49" charset="0"/>
+              </a:rPr>
+              <a:t>…</a:t>
+            </a:r>
+          </a:p>
+        </p:txBody>
+      </p:sp>
+      <p:cxnSp>
+        <p:nvCxnSpPr>
+          <p:cNvPr id="30" name="Straight Arrow Connector 29">
+            <a:extLst>
+              <a:ext uri="{FF2B5EF4-FFF2-40B4-BE49-F238E27FC236}">
+                <a16:creationId xmlns:a16="http://schemas.microsoft.com/office/drawing/2014/main" id="{60EAF3BA-7B51-473F-A407-D34B6F89405E}"/>
+              </a:ext>
+            </a:extLst>
+          </p:cNvPr>
+          <p:cNvCxnSpPr>
+            <a:cxnSpLocks/>
+          </p:cNvCxnSpPr>
+          <p:nvPr/>
+        </p:nvCxnSpPr>
+        <p:spPr>
+          <a:xfrm flipV="1">
+            <a:off x="8360758" y="4209477"/>
+            <a:ext cx="874589" cy="864165"/>
+          </a:xfrm>
+          <a:prstGeom prst="straightConnector1">
+            <a:avLst/>
+          </a:prstGeom>
+          <a:ln w="19050">
+            <a:prstDash val="solid"/>
+            <a:tailEnd type="triangle"/>
+          </a:ln>
+        </p:spPr>
+        <p:style>
+          <a:lnRef idx="1">
+            <a:schemeClr val="dk1"/>
+          </a:lnRef>
+          <a:fillRef idx="0">
+            <a:schemeClr val="dk1"/>
+          </a:fillRef>
+          <a:effectRef idx="0">
+            <a:schemeClr val="dk1"/>
+          </a:effectRef>
+          <a:fontRef idx="minor">
+            <a:schemeClr val="tx1"/>
+          </a:fontRef>
+        </p:style>
+      </p:cxnSp>
+    </p:spTree>
+    <p:extLst>
+      <p:ext uri="{BB962C8B-B14F-4D97-AF65-F5344CB8AC3E}">
+        <p14:creationId xmlns:p14="http://schemas.microsoft.com/office/powerpoint/2010/main" val="1300474914"/>
+      </p:ext>
+    </p:extLst>
+  </p:cSld>
+  <p:clrMapOvr>
+    <a:masterClrMapping/>
+  </p:clrMapOvr>
+</p:sld>
+</file>
+
 <file path=ppt/theme/theme1.xml><?xml version="1.0" encoding="utf-8"?>
 <a:theme xmlns:a="http://schemas.openxmlformats.org/drawingml/2006/main" name="Office Theme">
   <a:themeElements>

</xml_diff>